<commit_message>
update Final Project 2.1
</commit_message>
<xml_diff>
--- a/Final Project/Final Project - Intermediate Python AI Mentorship.pptx
+++ b/Final Project/Final Project - Intermediate Python AI Mentorship.pptx
@@ -28,6 +28,12 @@
     <p:sldId id="273" r:id="rId23"/>
     <p:sldId id="274" r:id="rId24"/>
     <p:sldId id="275" r:id="rId25"/>
+    <p:sldId id="276" r:id="rId26"/>
+    <p:sldId id="277" r:id="rId27"/>
+    <p:sldId id="278" r:id="rId28"/>
+    <p:sldId id="279" r:id="rId29"/>
+    <p:sldId id="280" r:id="rId30"/>
+    <p:sldId id="281" r:id="rId31"/>
   </p:sldIdLst>
   <p:sldSz cy="5143500" cx="9144000"/>
   <p:notesSz cx="6858000" cy="9144000"/>
@@ -809,7 +815,7 @@
   <p:cSld>
     <p:spTree>
       <p:nvGrpSpPr>
-        <p:cNvPr id="112" name="Shape 112"/>
+        <p:cNvPr id="113" name="Shape 113"/>
         <p:cNvGrpSpPr/>
         <p:nvPr/>
       </p:nvGrpSpPr>
@@ -823,7 +829,7 @@
       </p:grpSpPr>
       <p:sp>
         <p:nvSpPr>
-          <p:cNvPr id="113" name="Google Shape;113;gc5ccfc73d2_0_94:notes"/>
+          <p:cNvPr id="114" name="Google Shape;114;gc5ccfc73d2_0_88:notes"/>
           <p:cNvSpPr/>
           <p:nvPr>
             <p:ph idx="2" type="sldImg"/>
@@ -858,7 +864,7 @@
       </p:sp>
       <p:sp>
         <p:nvSpPr>
-          <p:cNvPr id="114" name="Google Shape;114;gc5ccfc73d2_0_94:notes"/>
+          <p:cNvPr id="115" name="Google Shape;115;gc5ccfc73d2_0_88:notes"/>
           <p:cNvSpPr txBox="1"/>
           <p:nvPr>
             <p:ph idx="1" type="body"/>
@@ -908,7 +914,7 @@
   <p:cSld>
     <p:spTree>
       <p:nvGrpSpPr>
-        <p:cNvPr id="119" name="Shape 119"/>
+        <p:cNvPr id="120" name="Shape 120"/>
         <p:cNvGrpSpPr/>
         <p:nvPr/>
       </p:nvGrpSpPr>
@@ -922,7 +928,7 @@
       </p:grpSpPr>
       <p:sp>
         <p:nvSpPr>
-          <p:cNvPr id="120" name="Google Shape;120;gc5ccfc73d2_0_100:notes"/>
+          <p:cNvPr id="121" name="Google Shape;121;gc5ccfc73d2_0_94:notes"/>
           <p:cNvSpPr/>
           <p:nvPr>
             <p:ph idx="2" type="sldImg"/>
@@ -957,7 +963,7 @@
       </p:sp>
       <p:sp>
         <p:nvSpPr>
-          <p:cNvPr id="121" name="Google Shape;121;gc5ccfc73d2_0_100:notes"/>
+          <p:cNvPr id="122" name="Google Shape;122;gc5ccfc73d2_0_94:notes"/>
           <p:cNvSpPr txBox="1"/>
           <p:nvPr>
             <p:ph idx="1" type="body"/>
@@ -1007,7 +1013,7 @@
   <p:cSld>
     <p:spTree>
       <p:nvGrpSpPr>
-        <p:cNvPr id="126" name="Shape 126"/>
+        <p:cNvPr id="127" name="Shape 127"/>
         <p:cNvGrpSpPr/>
         <p:nvPr/>
       </p:nvGrpSpPr>
@@ -1021,7 +1027,7 @@
       </p:grpSpPr>
       <p:sp>
         <p:nvSpPr>
-          <p:cNvPr id="127" name="Google Shape;127;gc5ccfc73d2_0_106:notes"/>
+          <p:cNvPr id="128" name="Google Shape;128;gc5ccfc73d2_0_100:notes"/>
           <p:cNvSpPr/>
           <p:nvPr>
             <p:ph idx="2" type="sldImg"/>
@@ -1056,7 +1062,7 @@
       </p:sp>
       <p:sp>
         <p:nvSpPr>
-          <p:cNvPr id="128" name="Google Shape;128;gc5ccfc73d2_0_106:notes"/>
+          <p:cNvPr id="129" name="Google Shape;129;gc5ccfc73d2_0_100:notes"/>
           <p:cNvSpPr txBox="1"/>
           <p:nvPr>
             <p:ph idx="1" type="body"/>
@@ -1120,7 +1126,7 @@
       </p:grpSpPr>
       <p:sp>
         <p:nvSpPr>
-          <p:cNvPr id="135" name="Google Shape;135;gc5ccfc73d2_0_113:notes"/>
+          <p:cNvPr id="135" name="Google Shape;135;gd86fabc18d_0_7:notes"/>
           <p:cNvSpPr/>
           <p:nvPr>
             <p:ph idx="2" type="sldImg"/>
@@ -1155,7 +1161,7 @@
       </p:sp>
       <p:sp>
         <p:nvSpPr>
-          <p:cNvPr id="136" name="Google Shape;136;gc5ccfc73d2_0_113:notes"/>
+          <p:cNvPr id="136" name="Google Shape;136;gd86fabc18d_0_7:notes"/>
           <p:cNvSpPr txBox="1"/>
           <p:nvPr>
             <p:ph idx="1" type="body"/>
@@ -1205,7 +1211,7 @@
   <p:cSld>
     <p:spTree>
       <p:nvGrpSpPr>
-        <p:cNvPr id="141" name="Shape 141"/>
+        <p:cNvPr id="142" name="Shape 142"/>
         <p:cNvGrpSpPr/>
         <p:nvPr/>
       </p:nvGrpSpPr>
@@ -1219,7 +1225,7 @@
       </p:grpSpPr>
       <p:sp>
         <p:nvSpPr>
-          <p:cNvPr id="142" name="Google Shape;142;gc5ccfc73d2_0_119:notes"/>
+          <p:cNvPr id="143" name="Google Shape;143;gc5ccfc73d2_0_106:notes"/>
           <p:cNvSpPr/>
           <p:nvPr>
             <p:ph idx="2" type="sldImg"/>
@@ -1254,7 +1260,7 @@
       </p:sp>
       <p:sp>
         <p:nvSpPr>
-          <p:cNvPr id="143" name="Google Shape;143;gc5ccfc73d2_0_119:notes"/>
+          <p:cNvPr id="144" name="Google Shape;144;gc5ccfc73d2_0_106:notes"/>
           <p:cNvSpPr txBox="1"/>
           <p:nvPr>
             <p:ph idx="1" type="body"/>
@@ -1304,7 +1310,7 @@
   <p:cSld>
     <p:spTree>
       <p:nvGrpSpPr>
-        <p:cNvPr id="148" name="Shape 148"/>
+        <p:cNvPr id="150" name="Shape 150"/>
         <p:cNvGrpSpPr/>
         <p:nvPr/>
       </p:nvGrpSpPr>
@@ -1318,7 +1324,7 @@
       </p:grpSpPr>
       <p:sp>
         <p:nvSpPr>
-          <p:cNvPr id="149" name="Google Shape;149;gc5ccfc73d2_0_125:notes"/>
+          <p:cNvPr id="151" name="Google Shape;151;gd86fabc18d_0_14:notes"/>
           <p:cNvSpPr/>
           <p:nvPr>
             <p:ph idx="2" type="sldImg"/>
@@ -1353,7 +1359,7 @@
       </p:sp>
       <p:sp>
         <p:nvSpPr>
-          <p:cNvPr id="150" name="Google Shape;150;gc5ccfc73d2_0_125:notes"/>
+          <p:cNvPr id="152" name="Google Shape;152;gd86fabc18d_0_14:notes"/>
           <p:cNvSpPr txBox="1"/>
           <p:nvPr>
             <p:ph idx="1" type="body"/>
@@ -1403,7 +1409,7 @@
   <p:cSld>
     <p:spTree>
       <p:nvGrpSpPr>
-        <p:cNvPr id="156" name="Shape 156"/>
+        <p:cNvPr id="158" name="Shape 158"/>
         <p:cNvGrpSpPr/>
         <p:nvPr/>
       </p:nvGrpSpPr>
@@ -1417,7 +1423,7 @@
       </p:grpSpPr>
       <p:sp>
         <p:nvSpPr>
-          <p:cNvPr id="157" name="Google Shape;157;gc5ccfc73d2_0_132:notes"/>
+          <p:cNvPr id="159" name="Google Shape;159;gc5ccfc73d2_0_113:notes"/>
           <p:cNvSpPr/>
           <p:nvPr>
             <p:ph idx="2" type="sldImg"/>
@@ -1452,7 +1458,7 @@
       </p:sp>
       <p:sp>
         <p:nvSpPr>
-          <p:cNvPr id="158" name="Google Shape;158;gc5ccfc73d2_0_132:notes"/>
+          <p:cNvPr id="160" name="Google Shape;160;gc5ccfc73d2_0_113:notes"/>
           <p:cNvSpPr txBox="1"/>
           <p:nvPr>
             <p:ph idx="1" type="body"/>
@@ -1502,7 +1508,7 @@
   <p:cSld>
     <p:spTree>
       <p:nvGrpSpPr>
-        <p:cNvPr id="164" name="Shape 164"/>
+        <p:cNvPr id="166" name="Shape 166"/>
         <p:cNvGrpSpPr/>
         <p:nvPr/>
       </p:nvGrpSpPr>
@@ -1516,7 +1522,7 @@
       </p:grpSpPr>
       <p:sp>
         <p:nvSpPr>
-          <p:cNvPr id="165" name="Google Shape;165;gc5ccfc73d2_0_139:notes"/>
+          <p:cNvPr id="167" name="Google Shape;167;gc5ccfc73d2_0_119:notes"/>
           <p:cNvSpPr/>
           <p:nvPr>
             <p:ph idx="2" type="sldImg"/>
@@ -1551,7 +1557,7 @@
       </p:sp>
       <p:sp>
         <p:nvSpPr>
-          <p:cNvPr id="166" name="Google Shape;166;gc5ccfc73d2_0_139:notes"/>
+          <p:cNvPr id="168" name="Google Shape;168;gc5ccfc73d2_0_119:notes"/>
           <p:cNvSpPr txBox="1"/>
           <p:nvPr>
             <p:ph idx="1" type="body"/>
@@ -1601,7 +1607,7 @@
   <p:cSld>
     <p:spTree>
       <p:nvGrpSpPr>
-        <p:cNvPr id="171" name="Shape 171"/>
+        <p:cNvPr id="173" name="Shape 173"/>
         <p:cNvGrpSpPr/>
         <p:nvPr/>
       </p:nvGrpSpPr>
@@ -1615,7 +1621,7 @@
       </p:grpSpPr>
       <p:sp>
         <p:nvSpPr>
-          <p:cNvPr id="172" name="Google Shape;172;gc5ccfc73d2_0_145:notes"/>
+          <p:cNvPr id="174" name="Google Shape;174;gd86fabc18d_0_41:notes"/>
           <p:cNvSpPr/>
           <p:nvPr>
             <p:ph idx="2" type="sldImg"/>
@@ -1650,7 +1656,7 @@
       </p:sp>
       <p:sp>
         <p:nvSpPr>
-          <p:cNvPr id="173" name="Google Shape;173;gc5ccfc73d2_0_145:notes"/>
+          <p:cNvPr id="175" name="Google Shape;175;gd86fabc18d_0_41:notes"/>
           <p:cNvSpPr txBox="1"/>
           <p:nvPr>
             <p:ph idx="1" type="body"/>
@@ -1700,7 +1706,7 @@
   <p:cSld>
     <p:spTree>
       <p:nvGrpSpPr>
-        <p:cNvPr id="178" name="Shape 178"/>
+        <p:cNvPr id="180" name="Shape 180"/>
         <p:cNvGrpSpPr/>
         <p:nvPr/>
       </p:nvGrpSpPr>
@@ -1714,7 +1720,7 @@
       </p:grpSpPr>
       <p:sp>
         <p:nvSpPr>
-          <p:cNvPr id="179" name="Google Shape;179;gc5ccfc73d2_0_151:notes"/>
+          <p:cNvPr id="181" name="Google Shape;181;gc5ccfc73d2_0_125:notes"/>
           <p:cNvSpPr/>
           <p:nvPr>
             <p:ph idx="2" type="sldImg"/>
@@ -1749,7 +1755,7 @@
       </p:sp>
       <p:sp>
         <p:nvSpPr>
-          <p:cNvPr id="180" name="Google Shape;180;gc5ccfc73d2_0_151:notes"/>
+          <p:cNvPr id="182" name="Google Shape;182;gc5ccfc73d2_0_125:notes"/>
           <p:cNvSpPr txBox="1"/>
           <p:nvPr>
             <p:ph idx="1" type="body"/>
@@ -1898,7 +1904,7 @@
   <p:cSld>
     <p:spTree>
       <p:nvGrpSpPr>
-        <p:cNvPr id="185" name="Shape 185"/>
+        <p:cNvPr id="188" name="Shape 188"/>
         <p:cNvGrpSpPr/>
         <p:nvPr/>
       </p:nvGrpSpPr>
@@ -1912,7 +1918,7 @@
       </p:grpSpPr>
       <p:sp>
         <p:nvSpPr>
-          <p:cNvPr id="186" name="Google Shape;186;gc5ccfc73d2_0_157:notes"/>
+          <p:cNvPr id="189" name="Google Shape;189;gc5ccfc73d2_0_132:notes"/>
           <p:cNvSpPr/>
           <p:nvPr>
             <p:ph idx="2" type="sldImg"/>
@@ -1947,7 +1953,601 @@
       </p:sp>
       <p:sp>
         <p:nvSpPr>
-          <p:cNvPr id="187" name="Google Shape;187;gc5ccfc73d2_0_157:notes"/>
+          <p:cNvPr id="190" name="Google Shape;190;gc5ccfc73d2_0_132:notes"/>
+          <p:cNvSpPr txBox="1"/>
+          <p:nvPr>
+            <p:ph idx="1" type="body"/>
+          </p:nvPr>
+        </p:nvSpPr>
+        <p:spPr>
+          <a:xfrm>
+            <a:off x="685800" y="4343400"/>
+            <a:ext cx="5486400" cy="4114800"/>
+          </a:xfrm>
+          <a:prstGeom prst="rect">
+            <a:avLst/>
+          </a:prstGeom>
+        </p:spPr>
+        <p:txBody>
+          <a:bodyPr anchorCtr="0" anchor="t" bIns="91425" lIns="91425" spcFirstLastPara="1" rIns="91425" wrap="square" tIns="91425">
+            <a:noAutofit/>
+          </a:bodyPr>
+          <a:lstStyle/>
+          <a:p>
+            <a:pPr indent="0" lvl="0" marL="0" rtl="0" algn="l">
+              <a:spcBef>
+                <a:spcPts val="0"/>
+              </a:spcBef>
+              <a:spcAft>
+                <a:spcPts val="0"/>
+              </a:spcAft>
+              <a:buNone/>
+            </a:pPr>
+            <a:r>
+              <a:t/>
+            </a:r>
+            <a:endParaRPr/>
+          </a:p>
+        </p:txBody>
+      </p:sp>
+    </p:spTree>
+  </p:cSld>
+  <p:clrMapOvr>
+    <a:masterClrMapping/>
+  </p:clrMapOvr>
+</p:notes>
+</file>
+
+<file path=ppt/notesSlides/notesSlide21.xml><?xml version="1.0" encoding="utf-8"?>
+<p:notes xmlns:a="http://schemas.openxmlformats.org/drawingml/2006/main" xmlns:r="http://schemas.openxmlformats.org/officeDocument/2006/relationships" xmlns:mc="http://schemas.openxmlformats.org/markup-compatibility/2006" xmlns:mv="urn:schemas-microsoft-com:mac:vml" xmlns:p="http://schemas.openxmlformats.org/presentationml/2006/main" xmlns:c="http://schemas.openxmlformats.org/drawingml/2006/chart" xmlns:dgm="http://schemas.openxmlformats.org/drawingml/2006/diagram" xmlns:o="urn:schemas-microsoft-com:office:office" xmlns:v="urn:schemas-microsoft-com:vml" xmlns:pvml="urn:schemas-microsoft-com:office:powerpoint" xmlns:com="http://schemas.openxmlformats.org/drawingml/2006/compatibility" xmlns:p14="http://schemas.microsoft.com/office/powerpoint/2010/main" xmlns:p15="http://schemas.microsoft.com/office/powerpoint/2012/main" xmlns:ahyp="http://schemas.microsoft.com/office/drawing/2018/hyperlinkcolor" showMasterPhAnim="0" showMasterSp="0">
+  <p:cSld>
+    <p:spTree>
+      <p:nvGrpSpPr>
+        <p:cNvPr id="197" name="Shape 197"/>
+        <p:cNvGrpSpPr/>
+        <p:nvPr/>
+      </p:nvGrpSpPr>
+      <p:grpSpPr>
+        <a:xfrm>
+          <a:off x="0" y="0"/>
+          <a:ext cx="0" cy="0"/>
+          <a:chOff x="0" y="0"/>
+          <a:chExt cx="0" cy="0"/>
+        </a:xfrm>
+      </p:grpSpPr>
+      <p:sp>
+        <p:nvSpPr>
+          <p:cNvPr id="198" name="Google Shape;198;gd86fabc18d_0_31:notes"/>
+          <p:cNvSpPr/>
+          <p:nvPr>
+            <p:ph idx="2" type="sldImg"/>
+          </p:nvPr>
+        </p:nvSpPr>
+        <p:spPr>
+          <a:xfrm>
+            <a:off x="381300" y="685800"/>
+            <a:ext cx="6096000" cy="3429000"/>
+          </a:xfrm>
+          <a:custGeom>
+            <a:rect b="b" l="l" r="r" t="t"/>
+            <a:pathLst>
+              <a:path extrusionOk="0" h="120000" w="120000">
+                <a:moveTo>
+                  <a:pt x="0" y="0"/>
+                </a:moveTo>
+                <a:lnTo>
+                  <a:pt x="120000" y="0"/>
+                </a:lnTo>
+                <a:lnTo>
+                  <a:pt x="120000" y="120000"/>
+                </a:lnTo>
+                <a:lnTo>
+                  <a:pt x="0" y="120000"/>
+                </a:lnTo>
+                <a:close/>
+              </a:path>
+            </a:pathLst>
+          </a:custGeom>
+        </p:spPr>
+      </p:sp>
+      <p:sp>
+        <p:nvSpPr>
+          <p:cNvPr id="199" name="Google Shape;199;gd86fabc18d_0_31:notes"/>
+          <p:cNvSpPr txBox="1"/>
+          <p:nvPr>
+            <p:ph idx="1" type="body"/>
+          </p:nvPr>
+        </p:nvSpPr>
+        <p:spPr>
+          <a:xfrm>
+            <a:off x="685800" y="4343400"/>
+            <a:ext cx="5486400" cy="4114800"/>
+          </a:xfrm>
+          <a:prstGeom prst="rect">
+            <a:avLst/>
+          </a:prstGeom>
+        </p:spPr>
+        <p:txBody>
+          <a:bodyPr anchorCtr="0" anchor="t" bIns="91425" lIns="91425" spcFirstLastPara="1" rIns="91425" wrap="square" tIns="91425">
+            <a:noAutofit/>
+          </a:bodyPr>
+          <a:lstStyle/>
+          <a:p>
+            <a:pPr indent="0" lvl="0" marL="0" rtl="0" algn="l">
+              <a:spcBef>
+                <a:spcPts val="0"/>
+              </a:spcBef>
+              <a:spcAft>
+                <a:spcPts val="0"/>
+              </a:spcAft>
+              <a:buNone/>
+            </a:pPr>
+            <a:r>
+              <a:t/>
+            </a:r>
+            <a:endParaRPr/>
+          </a:p>
+        </p:txBody>
+      </p:sp>
+    </p:spTree>
+  </p:cSld>
+  <p:clrMapOvr>
+    <a:masterClrMapping/>
+  </p:clrMapOvr>
+</p:notes>
+</file>
+
+<file path=ppt/notesSlides/notesSlide22.xml><?xml version="1.0" encoding="utf-8"?>
+<p:notes xmlns:a="http://schemas.openxmlformats.org/drawingml/2006/main" xmlns:r="http://schemas.openxmlformats.org/officeDocument/2006/relationships" xmlns:mc="http://schemas.openxmlformats.org/markup-compatibility/2006" xmlns:mv="urn:schemas-microsoft-com:mac:vml" xmlns:p="http://schemas.openxmlformats.org/presentationml/2006/main" xmlns:c="http://schemas.openxmlformats.org/drawingml/2006/chart" xmlns:dgm="http://schemas.openxmlformats.org/drawingml/2006/diagram" xmlns:o="urn:schemas-microsoft-com:office:office" xmlns:v="urn:schemas-microsoft-com:vml" xmlns:pvml="urn:schemas-microsoft-com:office:powerpoint" xmlns:com="http://schemas.openxmlformats.org/drawingml/2006/compatibility" xmlns:p14="http://schemas.microsoft.com/office/powerpoint/2010/main" xmlns:p15="http://schemas.microsoft.com/office/powerpoint/2012/main" xmlns:ahyp="http://schemas.microsoft.com/office/drawing/2018/hyperlinkcolor" showMasterPhAnim="0" showMasterSp="0">
+  <p:cSld>
+    <p:spTree>
+      <p:nvGrpSpPr>
+        <p:cNvPr id="204" name="Shape 204"/>
+        <p:cNvGrpSpPr/>
+        <p:nvPr/>
+      </p:nvGrpSpPr>
+      <p:grpSpPr>
+        <a:xfrm>
+          <a:off x="0" y="0"/>
+          <a:ext cx="0" cy="0"/>
+          <a:chOff x="0" y="0"/>
+          <a:chExt cx="0" cy="0"/>
+        </a:xfrm>
+      </p:grpSpPr>
+      <p:sp>
+        <p:nvSpPr>
+          <p:cNvPr id="205" name="Google Shape;205;gc5ccfc73d2_0_139:notes"/>
+          <p:cNvSpPr/>
+          <p:nvPr>
+            <p:ph idx="2" type="sldImg"/>
+          </p:nvPr>
+        </p:nvSpPr>
+        <p:spPr>
+          <a:xfrm>
+            <a:off x="381300" y="685800"/>
+            <a:ext cx="6096000" cy="3429000"/>
+          </a:xfrm>
+          <a:custGeom>
+            <a:rect b="b" l="l" r="r" t="t"/>
+            <a:pathLst>
+              <a:path extrusionOk="0" h="120000" w="120000">
+                <a:moveTo>
+                  <a:pt x="0" y="0"/>
+                </a:moveTo>
+                <a:lnTo>
+                  <a:pt x="120000" y="0"/>
+                </a:lnTo>
+                <a:lnTo>
+                  <a:pt x="120000" y="120000"/>
+                </a:lnTo>
+                <a:lnTo>
+                  <a:pt x="0" y="120000"/>
+                </a:lnTo>
+                <a:close/>
+              </a:path>
+            </a:pathLst>
+          </a:custGeom>
+        </p:spPr>
+      </p:sp>
+      <p:sp>
+        <p:nvSpPr>
+          <p:cNvPr id="206" name="Google Shape;206;gc5ccfc73d2_0_139:notes"/>
+          <p:cNvSpPr txBox="1"/>
+          <p:nvPr>
+            <p:ph idx="1" type="body"/>
+          </p:nvPr>
+        </p:nvSpPr>
+        <p:spPr>
+          <a:xfrm>
+            <a:off x="685800" y="4343400"/>
+            <a:ext cx="5486400" cy="4114800"/>
+          </a:xfrm>
+          <a:prstGeom prst="rect">
+            <a:avLst/>
+          </a:prstGeom>
+        </p:spPr>
+        <p:txBody>
+          <a:bodyPr anchorCtr="0" anchor="t" bIns="91425" lIns="91425" spcFirstLastPara="1" rIns="91425" wrap="square" tIns="91425">
+            <a:noAutofit/>
+          </a:bodyPr>
+          <a:lstStyle/>
+          <a:p>
+            <a:pPr indent="0" lvl="0" marL="0" rtl="0" algn="l">
+              <a:spcBef>
+                <a:spcPts val="0"/>
+              </a:spcBef>
+              <a:spcAft>
+                <a:spcPts val="0"/>
+              </a:spcAft>
+              <a:buNone/>
+            </a:pPr>
+            <a:r>
+              <a:t/>
+            </a:r>
+            <a:endParaRPr/>
+          </a:p>
+        </p:txBody>
+      </p:sp>
+    </p:spTree>
+  </p:cSld>
+  <p:clrMapOvr>
+    <a:masterClrMapping/>
+  </p:clrMapOvr>
+</p:notes>
+</file>
+
+<file path=ppt/notesSlides/notesSlide23.xml><?xml version="1.0" encoding="utf-8"?>
+<p:notes xmlns:a="http://schemas.openxmlformats.org/drawingml/2006/main" xmlns:r="http://schemas.openxmlformats.org/officeDocument/2006/relationships" xmlns:mc="http://schemas.openxmlformats.org/markup-compatibility/2006" xmlns:mv="urn:schemas-microsoft-com:mac:vml" xmlns:p="http://schemas.openxmlformats.org/presentationml/2006/main" xmlns:c="http://schemas.openxmlformats.org/drawingml/2006/chart" xmlns:dgm="http://schemas.openxmlformats.org/drawingml/2006/diagram" xmlns:o="urn:schemas-microsoft-com:office:office" xmlns:v="urn:schemas-microsoft-com:vml" xmlns:pvml="urn:schemas-microsoft-com:office:powerpoint" xmlns:com="http://schemas.openxmlformats.org/drawingml/2006/compatibility" xmlns:p14="http://schemas.microsoft.com/office/powerpoint/2010/main" xmlns:p15="http://schemas.microsoft.com/office/powerpoint/2012/main" xmlns:ahyp="http://schemas.microsoft.com/office/drawing/2018/hyperlinkcolor" showMasterPhAnim="0" showMasterSp="0">
+  <p:cSld>
+    <p:spTree>
+      <p:nvGrpSpPr>
+        <p:cNvPr id="211" name="Shape 211"/>
+        <p:cNvGrpSpPr/>
+        <p:nvPr/>
+      </p:nvGrpSpPr>
+      <p:grpSpPr>
+        <a:xfrm>
+          <a:off x="0" y="0"/>
+          <a:ext cx="0" cy="0"/>
+          <a:chOff x="0" y="0"/>
+          <a:chExt cx="0" cy="0"/>
+        </a:xfrm>
+      </p:grpSpPr>
+      <p:sp>
+        <p:nvSpPr>
+          <p:cNvPr id="212" name="Google Shape;212;gc5ccfc73d2_0_145:notes"/>
+          <p:cNvSpPr/>
+          <p:nvPr>
+            <p:ph idx="2" type="sldImg"/>
+          </p:nvPr>
+        </p:nvSpPr>
+        <p:spPr>
+          <a:xfrm>
+            <a:off x="381300" y="685800"/>
+            <a:ext cx="6096000" cy="3429000"/>
+          </a:xfrm>
+          <a:custGeom>
+            <a:rect b="b" l="l" r="r" t="t"/>
+            <a:pathLst>
+              <a:path extrusionOk="0" h="120000" w="120000">
+                <a:moveTo>
+                  <a:pt x="0" y="0"/>
+                </a:moveTo>
+                <a:lnTo>
+                  <a:pt x="120000" y="0"/>
+                </a:lnTo>
+                <a:lnTo>
+                  <a:pt x="120000" y="120000"/>
+                </a:lnTo>
+                <a:lnTo>
+                  <a:pt x="0" y="120000"/>
+                </a:lnTo>
+                <a:close/>
+              </a:path>
+            </a:pathLst>
+          </a:custGeom>
+        </p:spPr>
+      </p:sp>
+      <p:sp>
+        <p:nvSpPr>
+          <p:cNvPr id="213" name="Google Shape;213;gc5ccfc73d2_0_145:notes"/>
+          <p:cNvSpPr txBox="1"/>
+          <p:nvPr>
+            <p:ph idx="1" type="body"/>
+          </p:nvPr>
+        </p:nvSpPr>
+        <p:spPr>
+          <a:xfrm>
+            <a:off x="685800" y="4343400"/>
+            <a:ext cx="5486400" cy="4114800"/>
+          </a:xfrm>
+          <a:prstGeom prst="rect">
+            <a:avLst/>
+          </a:prstGeom>
+        </p:spPr>
+        <p:txBody>
+          <a:bodyPr anchorCtr="0" anchor="t" bIns="91425" lIns="91425" spcFirstLastPara="1" rIns="91425" wrap="square" tIns="91425">
+            <a:noAutofit/>
+          </a:bodyPr>
+          <a:lstStyle/>
+          <a:p>
+            <a:pPr indent="0" lvl="0" marL="0" rtl="0" algn="l">
+              <a:spcBef>
+                <a:spcPts val="0"/>
+              </a:spcBef>
+              <a:spcAft>
+                <a:spcPts val="0"/>
+              </a:spcAft>
+              <a:buNone/>
+            </a:pPr>
+            <a:r>
+              <a:t/>
+            </a:r>
+            <a:endParaRPr/>
+          </a:p>
+        </p:txBody>
+      </p:sp>
+    </p:spTree>
+  </p:cSld>
+  <p:clrMapOvr>
+    <a:masterClrMapping/>
+  </p:clrMapOvr>
+</p:notes>
+</file>
+
+<file path=ppt/notesSlides/notesSlide24.xml><?xml version="1.0" encoding="utf-8"?>
+<p:notes xmlns:a="http://schemas.openxmlformats.org/drawingml/2006/main" xmlns:r="http://schemas.openxmlformats.org/officeDocument/2006/relationships" xmlns:mc="http://schemas.openxmlformats.org/markup-compatibility/2006" xmlns:mv="urn:schemas-microsoft-com:mac:vml" xmlns:p="http://schemas.openxmlformats.org/presentationml/2006/main" xmlns:c="http://schemas.openxmlformats.org/drawingml/2006/chart" xmlns:dgm="http://schemas.openxmlformats.org/drawingml/2006/diagram" xmlns:o="urn:schemas-microsoft-com:office:office" xmlns:v="urn:schemas-microsoft-com:vml" xmlns:pvml="urn:schemas-microsoft-com:office:powerpoint" xmlns:com="http://schemas.openxmlformats.org/drawingml/2006/compatibility" xmlns:p14="http://schemas.microsoft.com/office/powerpoint/2010/main" xmlns:p15="http://schemas.microsoft.com/office/powerpoint/2012/main" xmlns:ahyp="http://schemas.microsoft.com/office/drawing/2018/hyperlinkcolor" showMasterPhAnim="0" showMasterSp="0">
+  <p:cSld>
+    <p:spTree>
+      <p:nvGrpSpPr>
+        <p:cNvPr id="218" name="Shape 218"/>
+        <p:cNvGrpSpPr/>
+        <p:nvPr/>
+      </p:nvGrpSpPr>
+      <p:grpSpPr>
+        <a:xfrm>
+          <a:off x="0" y="0"/>
+          <a:ext cx="0" cy="0"/>
+          <a:chOff x="0" y="0"/>
+          <a:chExt cx="0" cy="0"/>
+        </a:xfrm>
+      </p:grpSpPr>
+      <p:sp>
+        <p:nvSpPr>
+          <p:cNvPr id="219" name="Google Shape;219;gc5ccfc73d2_0_151:notes"/>
+          <p:cNvSpPr/>
+          <p:nvPr>
+            <p:ph idx="2" type="sldImg"/>
+          </p:nvPr>
+        </p:nvSpPr>
+        <p:spPr>
+          <a:xfrm>
+            <a:off x="381300" y="685800"/>
+            <a:ext cx="6096000" cy="3429000"/>
+          </a:xfrm>
+          <a:custGeom>
+            <a:rect b="b" l="l" r="r" t="t"/>
+            <a:pathLst>
+              <a:path extrusionOk="0" h="120000" w="120000">
+                <a:moveTo>
+                  <a:pt x="0" y="0"/>
+                </a:moveTo>
+                <a:lnTo>
+                  <a:pt x="120000" y="0"/>
+                </a:lnTo>
+                <a:lnTo>
+                  <a:pt x="120000" y="120000"/>
+                </a:lnTo>
+                <a:lnTo>
+                  <a:pt x="0" y="120000"/>
+                </a:lnTo>
+                <a:close/>
+              </a:path>
+            </a:pathLst>
+          </a:custGeom>
+        </p:spPr>
+      </p:sp>
+      <p:sp>
+        <p:nvSpPr>
+          <p:cNvPr id="220" name="Google Shape;220;gc5ccfc73d2_0_151:notes"/>
+          <p:cNvSpPr txBox="1"/>
+          <p:nvPr>
+            <p:ph idx="1" type="body"/>
+          </p:nvPr>
+        </p:nvSpPr>
+        <p:spPr>
+          <a:xfrm>
+            <a:off x="685800" y="4343400"/>
+            <a:ext cx="5486400" cy="4114800"/>
+          </a:xfrm>
+          <a:prstGeom prst="rect">
+            <a:avLst/>
+          </a:prstGeom>
+        </p:spPr>
+        <p:txBody>
+          <a:bodyPr anchorCtr="0" anchor="t" bIns="91425" lIns="91425" spcFirstLastPara="1" rIns="91425" wrap="square" tIns="91425">
+            <a:noAutofit/>
+          </a:bodyPr>
+          <a:lstStyle/>
+          <a:p>
+            <a:pPr indent="0" lvl="0" marL="0" rtl="0" algn="l">
+              <a:spcBef>
+                <a:spcPts val="0"/>
+              </a:spcBef>
+              <a:spcAft>
+                <a:spcPts val="0"/>
+              </a:spcAft>
+              <a:buNone/>
+            </a:pPr>
+            <a:r>
+              <a:t/>
+            </a:r>
+            <a:endParaRPr/>
+          </a:p>
+        </p:txBody>
+      </p:sp>
+    </p:spTree>
+  </p:cSld>
+  <p:clrMapOvr>
+    <a:masterClrMapping/>
+  </p:clrMapOvr>
+</p:notes>
+</file>
+
+<file path=ppt/notesSlides/notesSlide25.xml><?xml version="1.0" encoding="utf-8"?>
+<p:notes xmlns:a="http://schemas.openxmlformats.org/drawingml/2006/main" xmlns:r="http://schemas.openxmlformats.org/officeDocument/2006/relationships" xmlns:mc="http://schemas.openxmlformats.org/markup-compatibility/2006" xmlns:mv="urn:schemas-microsoft-com:mac:vml" xmlns:p="http://schemas.openxmlformats.org/presentationml/2006/main" xmlns:c="http://schemas.openxmlformats.org/drawingml/2006/chart" xmlns:dgm="http://schemas.openxmlformats.org/drawingml/2006/diagram" xmlns:o="urn:schemas-microsoft-com:office:office" xmlns:v="urn:schemas-microsoft-com:vml" xmlns:pvml="urn:schemas-microsoft-com:office:powerpoint" xmlns:com="http://schemas.openxmlformats.org/drawingml/2006/compatibility" xmlns:p14="http://schemas.microsoft.com/office/powerpoint/2010/main" xmlns:p15="http://schemas.microsoft.com/office/powerpoint/2012/main" xmlns:ahyp="http://schemas.microsoft.com/office/drawing/2018/hyperlinkcolor" showMasterPhAnim="0" showMasterSp="0">
+  <p:cSld>
+    <p:spTree>
+      <p:nvGrpSpPr>
+        <p:cNvPr id="225" name="Shape 225"/>
+        <p:cNvGrpSpPr/>
+        <p:nvPr/>
+      </p:nvGrpSpPr>
+      <p:grpSpPr>
+        <a:xfrm>
+          <a:off x="0" y="0"/>
+          <a:ext cx="0" cy="0"/>
+          <a:chOff x="0" y="0"/>
+          <a:chExt cx="0" cy="0"/>
+        </a:xfrm>
+      </p:grpSpPr>
+      <p:sp>
+        <p:nvSpPr>
+          <p:cNvPr id="226" name="Google Shape;226;gc5ccfc73d2_0_157:notes"/>
+          <p:cNvSpPr/>
+          <p:nvPr>
+            <p:ph idx="2" type="sldImg"/>
+          </p:nvPr>
+        </p:nvSpPr>
+        <p:spPr>
+          <a:xfrm>
+            <a:off x="381300" y="685800"/>
+            <a:ext cx="6096000" cy="3429000"/>
+          </a:xfrm>
+          <a:custGeom>
+            <a:rect b="b" l="l" r="r" t="t"/>
+            <a:pathLst>
+              <a:path extrusionOk="0" h="120000" w="120000">
+                <a:moveTo>
+                  <a:pt x="0" y="0"/>
+                </a:moveTo>
+                <a:lnTo>
+                  <a:pt x="120000" y="0"/>
+                </a:lnTo>
+                <a:lnTo>
+                  <a:pt x="120000" y="120000"/>
+                </a:lnTo>
+                <a:lnTo>
+                  <a:pt x="0" y="120000"/>
+                </a:lnTo>
+                <a:close/>
+              </a:path>
+            </a:pathLst>
+          </a:custGeom>
+        </p:spPr>
+      </p:sp>
+      <p:sp>
+        <p:nvSpPr>
+          <p:cNvPr id="227" name="Google Shape;227;gc5ccfc73d2_0_157:notes"/>
+          <p:cNvSpPr txBox="1"/>
+          <p:nvPr>
+            <p:ph idx="1" type="body"/>
+          </p:nvPr>
+        </p:nvSpPr>
+        <p:spPr>
+          <a:xfrm>
+            <a:off x="685800" y="4343400"/>
+            <a:ext cx="5486400" cy="4114800"/>
+          </a:xfrm>
+          <a:prstGeom prst="rect">
+            <a:avLst/>
+          </a:prstGeom>
+        </p:spPr>
+        <p:txBody>
+          <a:bodyPr anchorCtr="0" anchor="t" bIns="91425" lIns="91425" spcFirstLastPara="1" rIns="91425" wrap="square" tIns="91425">
+            <a:noAutofit/>
+          </a:bodyPr>
+          <a:lstStyle/>
+          <a:p>
+            <a:pPr indent="0" lvl="0" marL="0" rtl="0" algn="l">
+              <a:spcBef>
+                <a:spcPts val="0"/>
+              </a:spcBef>
+              <a:spcAft>
+                <a:spcPts val="0"/>
+              </a:spcAft>
+              <a:buNone/>
+            </a:pPr>
+            <a:r>
+              <a:t/>
+            </a:r>
+            <a:endParaRPr/>
+          </a:p>
+        </p:txBody>
+      </p:sp>
+    </p:spTree>
+  </p:cSld>
+  <p:clrMapOvr>
+    <a:masterClrMapping/>
+  </p:clrMapOvr>
+</p:notes>
+</file>
+
+<file path=ppt/notesSlides/notesSlide26.xml><?xml version="1.0" encoding="utf-8"?>
+<p:notes xmlns:a="http://schemas.openxmlformats.org/drawingml/2006/main" xmlns:r="http://schemas.openxmlformats.org/officeDocument/2006/relationships" xmlns:mc="http://schemas.openxmlformats.org/markup-compatibility/2006" xmlns:mv="urn:schemas-microsoft-com:mac:vml" xmlns:p="http://schemas.openxmlformats.org/presentationml/2006/main" xmlns:c="http://schemas.openxmlformats.org/drawingml/2006/chart" xmlns:dgm="http://schemas.openxmlformats.org/drawingml/2006/diagram" xmlns:o="urn:schemas-microsoft-com:office:office" xmlns:v="urn:schemas-microsoft-com:vml" xmlns:pvml="urn:schemas-microsoft-com:office:powerpoint" xmlns:com="http://schemas.openxmlformats.org/drawingml/2006/compatibility" xmlns:p14="http://schemas.microsoft.com/office/powerpoint/2010/main" xmlns:p15="http://schemas.microsoft.com/office/powerpoint/2012/main" xmlns:ahyp="http://schemas.microsoft.com/office/drawing/2018/hyperlinkcolor" showMasterPhAnim="0" showMasterSp="0">
+  <p:cSld>
+    <p:spTree>
+      <p:nvGrpSpPr>
+        <p:cNvPr id="232" name="Shape 232"/>
+        <p:cNvGrpSpPr/>
+        <p:nvPr/>
+      </p:nvGrpSpPr>
+      <p:grpSpPr>
+        <a:xfrm>
+          <a:off x="0" y="0"/>
+          <a:ext cx="0" cy="0"/>
+          <a:chOff x="0" y="0"/>
+          <a:chExt cx="0" cy="0"/>
+        </a:xfrm>
+      </p:grpSpPr>
+      <p:sp>
+        <p:nvSpPr>
+          <p:cNvPr id="233" name="Google Shape;233;gd86fabc18d_0_27:notes"/>
+          <p:cNvSpPr/>
+          <p:nvPr>
+            <p:ph idx="2" type="sldImg"/>
+          </p:nvPr>
+        </p:nvSpPr>
+        <p:spPr>
+          <a:xfrm>
+            <a:off x="381300" y="685800"/>
+            <a:ext cx="6096000" cy="3429000"/>
+          </a:xfrm>
+          <a:custGeom>
+            <a:rect b="b" l="l" r="r" t="t"/>
+            <a:pathLst>
+              <a:path extrusionOk="0" h="120000" w="120000">
+                <a:moveTo>
+                  <a:pt x="0" y="0"/>
+                </a:moveTo>
+                <a:lnTo>
+                  <a:pt x="120000" y="0"/>
+                </a:lnTo>
+                <a:lnTo>
+                  <a:pt x="120000" y="120000"/>
+                </a:lnTo>
+                <a:lnTo>
+                  <a:pt x="0" y="120000"/>
+                </a:lnTo>
+                <a:close/>
+              </a:path>
+            </a:pathLst>
+          </a:custGeom>
+        </p:spPr>
+      </p:sp>
+      <p:sp>
+        <p:nvSpPr>
+          <p:cNvPr id="234" name="Google Shape;234;gd86fabc18d_0_27:notes"/>
           <p:cNvSpPr txBox="1"/>
           <p:nvPr>
             <p:ph idx="1" type="body"/>
@@ -2110,7 +2710,7 @@
       </p:grpSpPr>
       <p:sp>
         <p:nvSpPr>
-          <p:cNvPr id="71" name="Google Shape;71;gc5ccfc73d2_0_58:notes"/>
+          <p:cNvPr id="71" name="Google Shape;71;gd86fabc18d_0_0:notes"/>
           <p:cNvSpPr/>
           <p:nvPr>
             <p:ph idx="2" type="sldImg"/>
@@ -2145,7 +2745,7 @@
       </p:sp>
       <p:sp>
         <p:nvSpPr>
-          <p:cNvPr id="72" name="Google Shape;72;gc5ccfc73d2_0_58:notes"/>
+          <p:cNvPr id="72" name="Google Shape;72;gd86fabc18d_0_0:notes"/>
           <p:cNvSpPr txBox="1"/>
           <p:nvPr>
             <p:ph idx="1" type="body"/>
@@ -2195,7 +2795,7 @@
   <p:cSld>
     <p:spTree>
       <p:nvGrpSpPr>
-        <p:cNvPr id="77" name="Shape 77"/>
+        <p:cNvPr id="78" name="Shape 78"/>
         <p:cNvGrpSpPr/>
         <p:nvPr/>
       </p:nvGrpSpPr>
@@ -2209,7 +2809,7 @@
       </p:grpSpPr>
       <p:sp>
         <p:nvSpPr>
-          <p:cNvPr id="78" name="Google Shape;78;gc5ccfc73d2_0_64:notes"/>
+          <p:cNvPr id="79" name="Google Shape;79;gc5ccfc73d2_0_58:notes"/>
           <p:cNvSpPr/>
           <p:nvPr>
             <p:ph idx="2" type="sldImg"/>
@@ -2244,7 +2844,7 @@
       </p:sp>
       <p:sp>
         <p:nvSpPr>
-          <p:cNvPr id="79" name="Google Shape;79;gc5ccfc73d2_0_64:notes"/>
+          <p:cNvPr id="80" name="Google Shape;80;gc5ccfc73d2_0_58:notes"/>
           <p:cNvSpPr txBox="1"/>
           <p:nvPr>
             <p:ph idx="1" type="body"/>
@@ -2294,7 +2894,7 @@
   <p:cSld>
     <p:spTree>
       <p:nvGrpSpPr>
-        <p:cNvPr id="84" name="Shape 84"/>
+        <p:cNvPr id="85" name="Shape 85"/>
         <p:cNvGrpSpPr/>
         <p:nvPr/>
       </p:nvGrpSpPr>
@@ -2308,7 +2908,7 @@
       </p:grpSpPr>
       <p:sp>
         <p:nvSpPr>
-          <p:cNvPr id="85" name="Google Shape;85;gc5ccfc73d2_0_70:notes"/>
+          <p:cNvPr id="86" name="Google Shape;86;gc5ccfc73d2_0_64:notes"/>
           <p:cNvSpPr/>
           <p:nvPr>
             <p:ph idx="2" type="sldImg"/>
@@ -2343,7 +2943,7 @@
       </p:sp>
       <p:sp>
         <p:nvSpPr>
-          <p:cNvPr id="86" name="Google Shape;86;gc5ccfc73d2_0_70:notes"/>
+          <p:cNvPr id="87" name="Google Shape;87;gc5ccfc73d2_0_64:notes"/>
           <p:cNvSpPr txBox="1"/>
           <p:nvPr>
             <p:ph idx="1" type="body"/>
@@ -2393,7 +2993,7 @@
   <p:cSld>
     <p:spTree>
       <p:nvGrpSpPr>
-        <p:cNvPr id="91" name="Shape 91"/>
+        <p:cNvPr id="92" name="Shape 92"/>
         <p:cNvGrpSpPr/>
         <p:nvPr/>
       </p:nvGrpSpPr>
@@ -2407,7 +3007,7 @@
       </p:grpSpPr>
       <p:sp>
         <p:nvSpPr>
-          <p:cNvPr id="92" name="Google Shape;92;gc5ccfc73d2_0_76:notes"/>
+          <p:cNvPr id="93" name="Google Shape;93;gc5ccfc73d2_0_70:notes"/>
           <p:cNvSpPr/>
           <p:nvPr>
             <p:ph idx="2" type="sldImg"/>
@@ -2442,7 +3042,7 @@
       </p:sp>
       <p:sp>
         <p:nvSpPr>
-          <p:cNvPr id="93" name="Google Shape;93;gc5ccfc73d2_0_76:notes"/>
+          <p:cNvPr id="94" name="Google Shape;94;gc5ccfc73d2_0_70:notes"/>
           <p:cNvSpPr txBox="1"/>
           <p:nvPr>
             <p:ph idx="1" type="body"/>
@@ -2492,7 +3092,7 @@
   <p:cSld>
     <p:spTree>
       <p:nvGrpSpPr>
-        <p:cNvPr id="98" name="Shape 98"/>
+        <p:cNvPr id="99" name="Shape 99"/>
         <p:cNvGrpSpPr/>
         <p:nvPr/>
       </p:nvGrpSpPr>
@@ -2506,7 +3106,7 @@
       </p:grpSpPr>
       <p:sp>
         <p:nvSpPr>
-          <p:cNvPr id="99" name="Google Shape;99;gc5ccfc73d2_0_82:notes"/>
+          <p:cNvPr id="100" name="Google Shape;100;gc5ccfc73d2_0_76:notes"/>
           <p:cNvSpPr/>
           <p:nvPr>
             <p:ph idx="2" type="sldImg"/>
@@ -2541,7 +3141,7 @@
       </p:sp>
       <p:sp>
         <p:nvSpPr>
-          <p:cNvPr id="100" name="Google Shape;100;gc5ccfc73d2_0_82:notes"/>
+          <p:cNvPr id="101" name="Google Shape;101;gc5ccfc73d2_0_76:notes"/>
           <p:cNvSpPr txBox="1"/>
           <p:nvPr>
             <p:ph idx="1" type="body"/>
@@ -2591,7 +3191,7 @@
   <p:cSld>
     <p:spTree>
       <p:nvGrpSpPr>
-        <p:cNvPr id="105" name="Shape 105"/>
+        <p:cNvPr id="106" name="Shape 106"/>
         <p:cNvGrpSpPr/>
         <p:nvPr/>
       </p:nvGrpSpPr>
@@ -2605,7 +3205,7 @@
       </p:grpSpPr>
       <p:sp>
         <p:nvSpPr>
-          <p:cNvPr id="106" name="Google Shape;106;gc5ccfc73d2_0_88:notes"/>
+          <p:cNvPr id="107" name="Google Shape;107;gc5ccfc73d2_0_82:notes"/>
           <p:cNvSpPr/>
           <p:nvPr>
             <p:ph idx="2" type="sldImg"/>
@@ -2640,7 +3240,7 @@
       </p:sp>
       <p:sp>
         <p:nvSpPr>
-          <p:cNvPr id="107" name="Google Shape;107;gc5ccfc73d2_0_88:notes"/>
+          <p:cNvPr id="108" name="Google Shape;108;gc5ccfc73d2_0_82:notes"/>
           <p:cNvSpPr txBox="1"/>
           <p:nvPr>
             <p:ph idx="1" type="body"/>
@@ -7523,7 +8123,7 @@
   <p:cSld>
     <p:spTree>
       <p:nvGrpSpPr>
-        <p:cNvPr id="115" name="Shape 115"/>
+        <p:cNvPr id="116" name="Shape 116"/>
         <p:cNvGrpSpPr/>
         <p:nvPr/>
       </p:nvGrpSpPr>
@@ -7537,7 +8137,7 @@
       </p:grpSpPr>
       <p:sp>
         <p:nvSpPr>
-          <p:cNvPr id="116" name="Google Shape;116;p22"/>
+          <p:cNvPr id="117" name="Google Shape;117;p22"/>
           <p:cNvSpPr txBox="1"/>
           <p:nvPr>
             <p:ph type="title"/>
@@ -7568,8 +8168,7 @@
               <a:buNone/>
             </a:pPr>
             <a:r>
-              <a:rPr lang="id"/>
-              <a:t>Step 5: Get Rid of Missing Data</a:t>
+              <a:t/>
             </a:r>
             <a:endParaRPr/>
           </a:p>
@@ -7577,7 +8176,7 @@
       </p:sp>
       <p:sp>
         <p:nvSpPr>
-          <p:cNvPr id="117" name="Google Shape;117;p22"/>
+          <p:cNvPr id="118" name="Google Shape;118;p22"/>
           <p:cNvSpPr txBox="1"/>
           <p:nvPr>
             <p:ph idx="1" type="body"/>
@@ -7585,8 +8184,8 @@
         </p:nvSpPr>
         <p:spPr>
           <a:xfrm>
-            <a:off x="311700" y="1152475"/>
-            <a:ext cx="8520600" cy="3416400"/>
+            <a:off x="3411100" y="1152475"/>
+            <a:ext cx="5421300" cy="3373200"/>
           </a:xfrm>
           <a:prstGeom prst="rect">
             <a:avLst/>
@@ -7603,6 +8202,38 @@
                 <a:spcPts val="0"/>
               </a:spcBef>
               <a:spcAft>
+                <a:spcPts val="0"/>
+              </a:spcAft>
+              <a:buNone/>
+            </a:pPr>
+            <a:r>
+              <a:rPr lang="id" sz="1900"/>
+              <a:t>Mari kita fokus ke harga!</a:t>
+            </a:r>
+            <a:endParaRPr sz="1900"/>
+          </a:p>
+          <a:p>
+            <a:pPr indent="0" lvl="0" marL="0" rtl="0" algn="l">
+              <a:spcBef>
+                <a:spcPts val="1200"/>
+              </a:spcBef>
+              <a:spcAft>
+                <a:spcPts val="0"/>
+              </a:spcAft>
+              <a:buNone/>
+            </a:pPr>
+            <a:r>
+              <a:rPr lang="id" sz="1900"/>
+              <a:t>Dapat dilihat statistical data seperti harga tertinggi, terendah, dan rata-rata</a:t>
+            </a:r>
+            <a:endParaRPr sz="1900"/>
+          </a:p>
+          <a:p>
+            <a:pPr indent="0" lvl="0" marL="0" rtl="0" algn="l">
+              <a:spcBef>
+                <a:spcPts val="1200"/>
+              </a:spcBef>
+              <a:spcAft>
                 <a:spcPts val="1200"/>
               </a:spcAft>
               <a:buNone/>
@@ -7610,13 +8241,13 @@
             <a:r>
               <a:t/>
             </a:r>
-            <a:endParaRPr/>
+            <a:endParaRPr sz="2400"/>
           </a:p>
         </p:txBody>
       </p:sp>
       <p:pic>
         <p:nvPicPr>
-          <p:cNvPr id="118" name="Google Shape;118;p22"/>
+          <p:cNvPr id="119" name="Google Shape;119;p22"/>
           <p:cNvPicPr preferRelativeResize="0"/>
           <p:nvPr/>
         </p:nvPicPr>
@@ -7630,8 +8261,8 @@
         </p:blipFill>
         <p:spPr>
           <a:xfrm>
-            <a:off x="405550" y="1017713"/>
-            <a:ext cx="5029200" cy="4010025"/>
+            <a:off x="311688" y="1152463"/>
+            <a:ext cx="2695575" cy="2733675"/>
           </a:xfrm>
           <a:prstGeom prst="rect">
             <a:avLst/>
@@ -7655,7 +8286,7 @@
   <p:cSld>
     <p:spTree>
       <p:nvGrpSpPr>
-        <p:cNvPr id="122" name="Shape 122"/>
+        <p:cNvPr id="123" name="Shape 123"/>
         <p:cNvGrpSpPr/>
         <p:nvPr/>
       </p:nvGrpSpPr>
@@ -7669,7 +8300,7 @@
       </p:grpSpPr>
       <p:sp>
         <p:nvSpPr>
-          <p:cNvPr id="123" name="Google Shape;123;p23"/>
+          <p:cNvPr id="124" name="Google Shape;124;p23"/>
           <p:cNvSpPr txBox="1"/>
           <p:nvPr>
             <p:ph type="title"/>
@@ -7700,7 +8331,8 @@
               <a:buNone/>
             </a:pPr>
             <a:r>
-              <a:t/>
+              <a:rPr lang="id"/>
+              <a:t>Step 5: Get Rid of Missing Data</a:t>
             </a:r>
             <a:endParaRPr/>
           </a:p>
@@ -7708,7 +8340,7 @@
       </p:sp>
       <p:sp>
         <p:nvSpPr>
-          <p:cNvPr id="124" name="Google Shape;124;p23"/>
+          <p:cNvPr id="125" name="Google Shape;125;p23"/>
           <p:cNvSpPr txBox="1"/>
           <p:nvPr>
             <p:ph idx="1" type="body"/>
@@ -7716,8 +8348,8 @@
         </p:nvSpPr>
         <p:spPr>
           <a:xfrm>
-            <a:off x="311700" y="1152475"/>
-            <a:ext cx="8520600" cy="3416400"/>
+            <a:off x="5814975" y="1152475"/>
+            <a:ext cx="3017400" cy="3416400"/>
           </a:xfrm>
           <a:prstGeom prst="rect">
             <a:avLst/>
@@ -7739,7 +8371,8 @@
               <a:buNone/>
             </a:pPr>
             <a:r>
-              <a:t/>
+              <a:rPr lang="id"/>
+              <a:t>Mari kita drop data hilang dengan persentase rendah</a:t>
             </a:r>
             <a:endParaRPr/>
           </a:p>
@@ -7747,7 +8380,7 @@
       </p:sp>
       <p:pic>
         <p:nvPicPr>
-          <p:cNvPr id="125" name="Google Shape;125;p23"/>
+          <p:cNvPr id="126" name="Google Shape;126;p23"/>
           <p:cNvPicPr preferRelativeResize="0"/>
           <p:nvPr/>
         </p:nvPicPr>
@@ -7761,8 +8394,8 @@
         </p:blipFill>
         <p:spPr>
           <a:xfrm>
-            <a:off x="311700" y="889000"/>
-            <a:ext cx="6553200" cy="3943350"/>
+            <a:off x="405550" y="1017713"/>
+            <a:ext cx="5029200" cy="4010025"/>
           </a:xfrm>
           <a:prstGeom prst="rect">
             <a:avLst/>
@@ -7786,7 +8419,7 @@
   <p:cSld>
     <p:spTree>
       <p:nvGrpSpPr>
-        <p:cNvPr id="129" name="Shape 129"/>
+        <p:cNvPr id="130" name="Shape 130"/>
         <p:cNvGrpSpPr/>
         <p:nvPr/>
       </p:nvGrpSpPr>
@@ -7800,7 +8433,7 @@
       </p:grpSpPr>
       <p:sp>
         <p:nvSpPr>
-          <p:cNvPr id="130" name="Google Shape;130;p24"/>
+          <p:cNvPr id="131" name="Google Shape;131;p24"/>
           <p:cNvSpPr txBox="1"/>
           <p:nvPr>
             <p:ph type="title"/>
@@ -7839,7 +8472,7 @@
       </p:sp>
       <p:sp>
         <p:nvSpPr>
-          <p:cNvPr id="131" name="Google Shape;131;p24"/>
+          <p:cNvPr id="132" name="Google Shape;132;p24"/>
           <p:cNvSpPr txBox="1"/>
           <p:nvPr>
             <p:ph idx="1" type="body"/>
@@ -7878,7 +8511,7 @@
       </p:sp>
       <p:pic>
         <p:nvPicPr>
-          <p:cNvPr id="132" name="Google Shape;132;p24"/>
+          <p:cNvPr id="133" name="Google Shape;133;p24"/>
           <p:cNvPicPr preferRelativeResize="0"/>
           <p:nvPr/>
         </p:nvPicPr>
@@ -7892,36 +8525,8 @@
         </p:blipFill>
         <p:spPr>
           <a:xfrm>
-            <a:off x="311688" y="445025"/>
-            <a:ext cx="5553075" cy="3981450"/>
-          </a:xfrm>
-          <a:prstGeom prst="rect">
-            <a:avLst/>
-          </a:prstGeom>
-          <a:noFill/>
-          <a:ln>
-            <a:noFill/>
-          </a:ln>
-        </p:spPr>
-      </p:pic>
-      <p:pic>
-        <p:nvPicPr>
-          <p:cNvPr id="133" name="Google Shape;133;p24"/>
-          <p:cNvPicPr preferRelativeResize="0"/>
-          <p:nvPr/>
-        </p:nvPicPr>
-        <p:blipFill>
-          <a:blip r:embed="rId4">
-            <a:alphaModFix/>
-          </a:blip>
-          <a:stretch>
-            <a:fillRect/>
-          </a:stretch>
-        </p:blipFill>
-        <p:spPr>
-          <a:xfrm>
-            <a:off x="6029125" y="3607325"/>
-            <a:ext cx="1123950" cy="819150"/>
+            <a:off x="311700" y="889000"/>
+            <a:ext cx="6553200" cy="3943350"/>
           </a:xfrm>
           <a:prstGeom prst="rect">
             <a:avLst/>
@@ -7990,8 +8595,7 @@
               <a:buNone/>
             </a:pPr>
             <a:r>
-              <a:rPr lang="id"/>
-              <a:t>Step 6: Make a New Category based on price</a:t>
+              <a:t/>
             </a:r>
             <a:endParaRPr/>
           </a:p>
@@ -8052,8 +8656,8 @@
         </p:blipFill>
         <p:spPr>
           <a:xfrm>
-            <a:off x="311688" y="1152463"/>
-            <a:ext cx="8162925" cy="2543175"/>
+            <a:off x="201450" y="1152475"/>
+            <a:ext cx="8423675" cy="2922350"/>
           </a:xfrm>
           <a:prstGeom prst="rect">
             <a:avLst/>
@@ -8064,6 +8668,64 @@
           </a:ln>
         </p:spPr>
       </p:pic>
+      <p:sp>
+        <p:nvSpPr>
+          <p:cNvPr id="141" name="Google Shape;141;p25"/>
+          <p:cNvSpPr/>
+          <p:nvPr/>
+        </p:nvSpPr>
+        <p:spPr>
+          <a:xfrm>
+            <a:off x="5774825" y="2468330"/>
+            <a:ext cx="879025" cy="556250"/>
+          </a:xfrm>
+          <a:custGeom>
+            <a:rect b="b" l="l" r="r" t="t"/>
+            <a:pathLst>
+              <a:path extrusionOk="0" h="22250" w="35161">
+                <a:moveTo>
+                  <a:pt x="29002" y="2794"/>
+                </a:moveTo>
+                <a:cubicBezTo>
+                  <a:pt x="20758" y="2794"/>
+                  <a:pt x="11362" y="-2522"/>
+                  <a:pt x="4292" y="1720"/>
+                </a:cubicBezTo>
+                <a:cubicBezTo>
+                  <a:pt x="227" y="4159"/>
+                  <a:pt x="-1356" y="11984"/>
+                  <a:pt x="1606" y="15686"/>
+                </a:cubicBezTo>
+                <a:cubicBezTo>
+                  <a:pt x="7879" y="23527"/>
+                  <a:pt x="24587" y="24399"/>
+                  <a:pt x="31688" y="17298"/>
+                </a:cubicBezTo>
+                <a:cubicBezTo>
+                  <a:pt x="34176" y="14810"/>
+                  <a:pt x="36325" y="10019"/>
+                  <a:pt x="34374" y="7091"/>
+                </a:cubicBezTo>
+                <a:cubicBezTo>
+                  <a:pt x="33118" y="5206"/>
+                  <a:pt x="30193" y="4943"/>
+                  <a:pt x="27928" y="4943"/>
+                </a:cubicBezTo>
+              </a:path>
+            </a:pathLst>
+          </a:custGeom>
+          <a:noFill/>
+          <a:ln cap="flat" cmpd="sng" w="28575">
+            <a:solidFill>
+              <a:srgbClr val="FF0000"/>
+            </a:solidFill>
+            <a:prstDash val="solid"/>
+            <a:round/>
+            <a:headEnd len="med" w="med" type="none"/>
+            <a:tailEnd len="med" w="med" type="none"/>
+          </a:ln>
+        </p:spPr>
+      </p:sp>
     </p:spTree>
   </p:cSld>
   <p:clrMapOvr>
@@ -8077,7 +8739,7 @@
   <p:cSld>
     <p:spTree>
       <p:nvGrpSpPr>
-        <p:cNvPr id="144" name="Shape 144"/>
+        <p:cNvPr id="145" name="Shape 145"/>
         <p:cNvGrpSpPr/>
         <p:nvPr/>
       </p:nvGrpSpPr>
@@ -8091,7 +8753,7 @@
       </p:grpSpPr>
       <p:sp>
         <p:nvSpPr>
-          <p:cNvPr id="145" name="Google Shape;145;p26"/>
+          <p:cNvPr id="146" name="Google Shape;146;p26"/>
           <p:cNvSpPr txBox="1"/>
           <p:nvPr>
             <p:ph type="title"/>
@@ -8130,7 +8792,7 @@
       </p:sp>
       <p:sp>
         <p:nvSpPr>
-          <p:cNvPr id="146" name="Google Shape;146;p26"/>
+          <p:cNvPr id="147" name="Google Shape;147;p26"/>
           <p:cNvSpPr txBox="1"/>
           <p:nvPr>
             <p:ph idx="1" type="body"/>
@@ -8169,7 +8831,7 @@
       </p:sp>
       <p:pic>
         <p:nvPicPr>
-          <p:cNvPr id="147" name="Google Shape;147;p26"/>
+          <p:cNvPr id="148" name="Google Shape;148;p26"/>
           <p:cNvPicPr preferRelativeResize="0"/>
           <p:nvPr/>
         </p:nvPicPr>
@@ -8183,8 +8845,36 @@
         </p:blipFill>
         <p:spPr>
           <a:xfrm>
-            <a:off x="311700" y="923700"/>
-            <a:ext cx="8242899" cy="2858625"/>
+            <a:off x="311688" y="445025"/>
+            <a:ext cx="5553075" cy="3981450"/>
+          </a:xfrm>
+          <a:prstGeom prst="rect">
+            <a:avLst/>
+          </a:prstGeom>
+          <a:noFill/>
+          <a:ln>
+            <a:noFill/>
+          </a:ln>
+        </p:spPr>
+      </p:pic>
+      <p:pic>
+        <p:nvPicPr>
+          <p:cNvPr id="149" name="Google Shape;149;p26"/>
+          <p:cNvPicPr preferRelativeResize="0"/>
+          <p:nvPr/>
+        </p:nvPicPr>
+        <p:blipFill>
+          <a:blip r:embed="rId4">
+            <a:alphaModFix/>
+          </a:blip>
+          <a:stretch>
+            <a:fillRect/>
+          </a:stretch>
+        </p:blipFill>
+        <p:spPr>
+          <a:xfrm>
+            <a:off x="6029125" y="3607325"/>
+            <a:ext cx="1123950" cy="819150"/>
           </a:xfrm>
           <a:prstGeom prst="rect">
             <a:avLst/>
@@ -8208,7 +8898,7 @@
   <p:cSld>
     <p:spTree>
       <p:nvGrpSpPr>
-        <p:cNvPr id="151" name="Shape 151"/>
+        <p:cNvPr id="153" name="Shape 153"/>
         <p:cNvGrpSpPr/>
         <p:nvPr/>
       </p:nvGrpSpPr>
@@ -8222,7 +8912,7 @@
       </p:grpSpPr>
       <p:sp>
         <p:nvSpPr>
-          <p:cNvPr id="152" name="Google Shape;152;p27"/>
+          <p:cNvPr id="154" name="Google Shape;154;p27"/>
           <p:cNvSpPr txBox="1"/>
           <p:nvPr>
             <p:ph type="title"/>
@@ -8253,8 +8943,7 @@
               <a:buNone/>
             </a:pPr>
             <a:r>
-              <a:rPr lang="id"/>
-              <a:t>Step 7: Filter All Data with Reviews above 2019</a:t>
+              <a:t/>
             </a:r>
             <a:endParaRPr/>
           </a:p>
@@ -8262,7 +8951,7 @@
       </p:sp>
       <p:sp>
         <p:nvSpPr>
-          <p:cNvPr id="153" name="Google Shape;153;p27"/>
+          <p:cNvPr id="155" name="Google Shape;155;p27"/>
           <p:cNvSpPr txBox="1"/>
           <p:nvPr>
             <p:ph idx="1" type="body"/>
@@ -8301,7 +8990,7 @@
       </p:sp>
       <p:pic>
         <p:nvPicPr>
-          <p:cNvPr id="154" name="Google Shape;154;p27"/>
+          <p:cNvPr id="156" name="Google Shape;156;p27"/>
           <p:cNvPicPr preferRelativeResize="0"/>
           <p:nvPr/>
         </p:nvPicPr>
@@ -8315,8 +9004,8 @@
         </p:blipFill>
         <p:spPr>
           <a:xfrm>
-            <a:off x="311700" y="1152476"/>
-            <a:ext cx="7990551" cy="3142800"/>
+            <a:off x="0" y="911150"/>
+            <a:ext cx="9144000" cy="3547450"/>
           </a:xfrm>
           <a:prstGeom prst="rect">
             <a:avLst/>
@@ -8327,34 +9016,74 @@
           </a:ln>
         </p:spPr>
       </p:pic>
-      <p:pic>
-        <p:nvPicPr>
-          <p:cNvPr id="155" name="Google Shape;155;p27"/>
-          <p:cNvPicPr preferRelativeResize="0"/>
+      <p:sp>
+        <p:nvSpPr>
+          <p:cNvPr id="157" name="Google Shape;157;p27"/>
+          <p:cNvSpPr/>
           <p:nvPr/>
-        </p:nvPicPr>
-        <p:blipFill>
-          <a:blip r:embed="rId4">
-            <a:alphaModFix/>
-          </a:blip>
-          <a:stretch>
-            <a:fillRect/>
-          </a:stretch>
-        </p:blipFill>
-        <p:spPr>
-          <a:xfrm>
-            <a:off x="311700" y="4430013"/>
-            <a:ext cx="1181100" cy="638175"/>
-          </a:xfrm>
-          <a:prstGeom prst="rect">
-            <a:avLst/>
-          </a:prstGeom>
+        </p:nvSpPr>
+        <p:spPr>
+          <a:xfrm>
+            <a:off x="4836424" y="2445891"/>
+            <a:ext cx="985900" cy="639750"/>
+          </a:xfrm>
+          <a:custGeom>
+            <a:rect b="b" l="l" r="r" t="t"/>
+            <a:pathLst>
+              <a:path extrusionOk="0" h="25590" w="39436">
+                <a:moveTo>
+                  <a:pt x="29473" y="5303"/>
+                </a:moveTo>
+                <a:cubicBezTo>
+                  <a:pt x="23891" y="2113"/>
+                  <a:pt x="16975" y="2265"/>
+                  <a:pt x="10671" y="1005"/>
+                </a:cubicBezTo>
+                <a:cubicBezTo>
+                  <a:pt x="8037" y="478"/>
+                  <a:pt x="4513" y="-894"/>
+                  <a:pt x="2614" y="1005"/>
+                </a:cubicBezTo>
+                <a:cubicBezTo>
+                  <a:pt x="-1819" y="5438"/>
+                  <a:pt x="348" y="14198"/>
+                  <a:pt x="3151" y="19806"/>
+                </a:cubicBezTo>
+                <a:cubicBezTo>
+                  <a:pt x="5735" y="24976"/>
+                  <a:pt x="14102" y="23691"/>
+                  <a:pt x="19804" y="24641"/>
+                </a:cubicBezTo>
+                <a:cubicBezTo>
+                  <a:pt x="24953" y="25499"/>
+                  <a:pt x="31691" y="26721"/>
+                  <a:pt x="35382" y="23030"/>
+                </a:cubicBezTo>
+                <a:cubicBezTo>
+                  <a:pt x="38859" y="19553"/>
+                  <a:pt x="40796" y="12617"/>
+                  <a:pt x="38068" y="8526"/>
+                </a:cubicBezTo>
+                <a:cubicBezTo>
+                  <a:pt x="36291" y="5861"/>
+                  <a:pt x="32338" y="5661"/>
+                  <a:pt x="29473" y="4228"/>
+                </a:cubicBezTo>
+              </a:path>
+            </a:pathLst>
+          </a:custGeom>
           <a:noFill/>
-          <a:ln>
-            <a:noFill/>
+          <a:ln cap="flat" cmpd="sng" w="28575">
+            <a:solidFill>
+              <a:srgbClr val="FF0000"/>
+            </a:solidFill>
+            <a:prstDash val="solid"/>
+            <a:round/>
+            <a:headEnd len="med" w="med" type="none"/>
+            <a:tailEnd len="med" w="med" type="none"/>
           </a:ln>
         </p:spPr>
-      </p:pic>
+      </p:sp>
     </p:spTree>
   </p:cSld>
   <p:clrMapOvr>
@@ -8368,7 +9097,7 @@
   <p:cSld>
     <p:spTree>
       <p:nvGrpSpPr>
-        <p:cNvPr id="159" name="Shape 159"/>
+        <p:cNvPr id="161" name="Shape 161"/>
         <p:cNvGrpSpPr/>
         <p:nvPr/>
       </p:nvGrpSpPr>
@@ -8382,7 +9111,7 @@
       </p:grpSpPr>
       <p:sp>
         <p:nvSpPr>
-          <p:cNvPr id="160" name="Google Shape;160;p28"/>
+          <p:cNvPr id="162" name="Google Shape;162;p28"/>
           <p:cNvSpPr txBox="1"/>
           <p:nvPr>
             <p:ph type="title"/>
@@ -8414,7 +9143,7 @@
             </a:pPr>
             <a:r>
               <a:rPr lang="id"/>
-              <a:t>Step 8: Visualize Price Comparison between room</a:t>
+              <a:t>Step 6: Make a New Category based on price</a:t>
             </a:r>
             <a:endParaRPr/>
           </a:p>
@@ -8422,7 +9151,7 @@
       </p:sp>
       <p:sp>
         <p:nvSpPr>
-          <p:cNvPr id="161" name="Google Shape;161;p28"/>
+          <p:cNvPr id="163" name="Google Shape;163;p28"/>
           <p:cNvSpPr txBox="1"/>
           <p:nvPr>
             <p:ph idx="1" type="body"/>
@@ -8461,7 +9190,7 @@
       </p:sp>
       <p:pic>
         <p:nvPicPr>
-          <p:cNvPr id="162" name="Google Shape;162;p28"/>
+          <p:cNvPr id="164" name="Google Shape;164;p28"/>
           <p:cNvPicPr preferRelativeResize="0"/>
           <p:nvPr/>
         </p:nvPicPr>
@@ -8475,8 +9204,8 @@
         </p:blipFill>
         <p:spPr>
           <a:xfrm>
-            <a:off x="405688" y="1034388"/>
-            <a:ext cx="2733675" cy="1181100"/>
+            <a:off x="311688" y="1152463"/>
+            <a:ext cx="8162925" cy="2543175"/>
           </a:xfrm>
           <a:prstGeom prst="rect">
             <a:avLst/>
@@ -8489,7 +9218,7 @@
       </p:pic>
       <p:pic>
         <p:nvPicPr>
-          <p:cNvPr id="163" name="Google Shape;163;p28"/>
+          <p:cNvPr id="165" name="Google Shape;165;p28"/>
           <p:cNvPicPr preferRelativeResize="0"/>
           <p:nvPr/>
         </p:nvPicPr>
@@ -8503,8 +9232,8 @@
         </p:blipFill>
         <p:spPr>
           <a:xfrm>
-            <a:off x="405700" y="2312747"/>
-            <a:ext cx="6844374" cy="2695450"/>
+            <a:off x="311700" y="3695650"/>
+            <a:ext cx="3733800" cy="857250"/>
           </a:xfrm>
           <a:prstGeom prst="rect">
             <a:avLst/>
@@ -8528,7 +9257,7 @@
   <p:cSld>
     <p:spTree>
       <p:nvGrpSpPr>
-        <p:cNvPr id="167" name="Shape 167"/>
+        <p:cNvPr id="169" name="Shape 169"/>
         <p:cNvGrpSpPr/>
         <p:nvPr/>
       </p:nvGrpSpPr>
@@ -8542,7 +9271,7 @@
       </p:grpSpPr>
       <p:sp>
         <p:nvSpPr>
-          <p:cNvPr id="168" name="Google Shape;168;p29"/>
+          <p:cNvPr id="170" name="Google Shape;170;p29"/>
           <p:cNvSpPr txBox="1"/>
           <p:nvPr>
             <p:ph type="title"/>
@@ -8581,7 +9310,7 @@
       </p:sp>
       <p:sp>
         <p:nvSpPr>
-          <p:cNvPr id="169" name="Google Shape;169;p29"/>
+          <p:cNvPr id="171" name="Google Shape;171;p29"/>
           <p:cNvSpPr txBox="1"/>
           <p:nvPr>
             <p:ph idx="1" type="body"/>
@@ -8620,7 +9349,7 @@
       </p:sp>
       <p:pic>
         <p:nvPicPr>
-          <p:cNvPr id="170" name="Google Shape;170;p29"/>
+          <p:cNvPr id="172" name="Google Shape;172;p29"/>
           <p:cNvPicPr preferRelativeResize="0"/>
           <p:nvPr/>
         </p:nvPicPr>
@@ -8634,8 +9363,8 @@
         </p:blipFill>
         <p:spPr>
           <a:xfrm>
-            <a:off x="297000" y="1152475"/>
-            <a:ext cx="8549997" cy="3340100"/>
+            <a:off x="247700" y="445025"/>
+            <a:ext cx="8648600" cy="3658400"/>
           </a:xfrm>
           <a:prstGeom prst="rect">
             <a:avLst/>
@@ -8659,7 +9388,7 @@
   <p:cSld>
     <p:spTree>
       <p:nvGrpSpPr>
-        <p:cNvPr id="174" name="Shape 174"/>
+        <p:cNvPr id="176" name="Shape 176"/>
         <p:cNvGrpSpPr/>
         <p:nvPr/>
       </p:nvGrpSpPr>
@@ -8673,7 +9402,7 @@
       </p:grpSpPr>
       <p:sp>
         <p:nvSpPr>
-          <p:cNvPr id="175" name="Google Shape;175;p30"/>
+          <p:cNvPr id="177" name="Google Shape;177;p30"/>
           <p:cNvSpPr txBox="1"/>
           <p:nvPr>
             <p:ph type="title"/>
@@ -8712,7 +9441,7 @@
       </p:sp>
       <p:sp>
         <p:nvSpPr>
-          <p:cNvPr id="176" name="Google Shape;176;p30"/>
+          <p:cNvPr id="178" name="Google Shape;178;p30"/>
           <p:cNvSpPr txBox="1"/>
           <p:nvPr>
             <p:ph idx="1" type="body"/>
@@ -8751,7 +9480,7 @@
       </p:sp>
       <p:pic>
         <p:nvPicPr>
-          <p:cNvPr id="177" name="Google Shape;177;p30"/>
+          <p:cNvPr id="179" name="Google Shape;179;p30"/>
           <p:cNvPicPr preferRelativeResize="0"/>
           <p:nvPr/>
         </p:nvPicPr>
@@ -8765,8 +9494,8 @@
         </p:blipFill>
         <p:spPr>
           <a:xfrm>
-            <a:off x="311700" y="1005577"/>
-            <a:ext cx="7909975" cy="3132350"/>
+            <a:off x="311700" y="1152479"/>
+            <a:ext cx="8520601" cy="2021546"/>
           </a:xfrm>
           <a:prstGeom prst="rect">
             <a:avLst/>
@@ -8790,7 +9519,7 @@
   <p:cSld>
     <p:spTree>
       <p:nvGrpSpPr>
-        <p:cNvPr id="181" name="Shape 181"/>
+        <p:cNvPr id="183" name="Shape 183"/>
         <p:cNvGrpSpPr/>
         <p:nvPr/>
       </p:nvGrpSpPr>
@@ -8804,7 +9533,7 @@
       </p:grpSpPr>
       <p:sp>
         <p:nvSpPr>
-          <p:cNvPr id="182" name="Google Shape;182;p31"/>
+          <p:cNvPr id="184" name="Google Shape;184;p31"/>
           <p:cNvSpPr txBox="1"/>
           <p:nvPr>
             <p:ph type="title"/>
@@ -8835,7 +9564,8 @@
               <a:buNone/>
             </a:pPr>
             <a:r>
-              <a:t/>
+              <a:rPr lang="id"/>
+              <a:t>Step 7: Filter All Data with Reviews above 2019</a:t>
             </a:r>
             <a:endParaRPr/>
           </a:p>
@@ -8843,7 +9573,7 @@
       </p:sp>
       <p:sp>
         <p:nvSpPr>
-          <p:cNvPr id="183" name="Google Shape;183;p31"/>
+          <p:cNvPr id="185" name="Google Shape;185;p31"/>
           <p:cNvSpPr txBox="1"/>
           <p:nvPr>
             <p:ph idx="1" type="body"/>
@@ -8882,7 +9612,7 @@
       </p:sp>
       <p:pic>
         <p:nvPicPr>
-          <p:cNvPr id="184" name="Google Shape;184;p31"/>
+          <p:cNvPr id="186" name="Google Shape;186;p31"/>
           <p:cNvPicPr preferRelativeResize="0"/>
           <p:nvPr/>
         </p:nvPicPr>
@@ -8896,8 +9626,36 @@
         </p:blipFill>
         <p:spPr>
           <a:xfrm>
-            <a:off x="311700" y="1152474"/>
-            <a:ext cx="8071126" cy="1673450"/>
+            <a:off x="311700" y="1152476"/>
+            <a:ext cx="7990551" cy="3142800"/>
+          </a:xfrm>
+          <a:prstGeom prst="rect">
+            <a:avLst/>
+          </a:prstGeom>
+          <a:noFill/>
+          <a:ln>
+            <a:noFill/>
+          </a:ln>
+        </p:spPr>
+      </p:pic>
+      <p:pic>
+        <p:nvPicPr>
+          <p:cNvPr id="187" name="Google Shape;187;p31"/>
+          <p:cNvPicPr preferRelativeResize="0"/>
+          <p:nvPr/>
+        </p:nvPicPr>
+        <p:blipFill>
+          <a:blip r:embed="rId4">
+            <a:alphaModFix/>
+          </a:blip>
+          <a:stretch>
+            <a:fillRect/>
+          </a:stretch>
+        </p:blipFill>
+        <p:spPr>
+          <a:xfrm>
+            <a:off x="311700" y="4430013"/>
+            <a:ext cx="1181100" cy="638175"/>
           </a:xfrm>
           <a:prstGeom prst="rect">
             <a:avLst/>
@@ -9053,7 +9811,7 @@
   <p:cSld>
     <p:spTree>
       <p:nvGrpSpPr>
-        <p:cNvPr id="188" name="Shape 188"/>
+        <p:cNvPr id="191" name="Shape 191"/>
         <p:cNvGrpSpPr/>
         <p:nvPr/>
       </p:nvGrpSpPr>
@@ -9067,7 +9825,7 @@
       </p:grpSpPr>
       <p:sp>
         <p:nvSpPr>
-          <p:cNvPr id="189" name="Google Shape;189;p32"/>
+          <p:cNvPr id="192" name="Google Shape;192;p32"/>
           <p:cNvSpPr txBox="1"/>
           <p:nvPr>
             <p:ph type="title"/>
@@ -9099,7 +9857,7 @@
             </a:pPr>
             <a:r>
               <a:rPr lang="id"/>
-              <a:t>Price Comparison between room types</a:t>
+              <a:t>Step 8: Visualize Price Comparison between room</a:t>
             </a:r>
             <a:endParaRPr/>
           </a:p>
@@ -9107,7 +9865,7 @@
       </p:sp>
       <p:sp>
         <p:nvSpPr>
-          <p:cNvPr id="190" name="Google Shape;190;p32"/>
+          <p:cNvPr id="193" name="Google Shape;193;p32"/>
           <p:cNvSpPr txBox="1"/>
           <p:nvPr>
             <p:ph idx="1" type="body"/>
@@ -9146,7 +9904,7 @@
       </p:sp>
       <p:pic>
         <p:nvPicPr>
-          <p:cNvPr id="191" name="Google Shape;191;p32"/>
+          <p:cNvPr id="194" name="Google Shape;194;p32"/>
           <p:cNvPicPr preferRelativeResize="0"/>
           <p:nvPr/>
         </p:nvPicPr>
@@ -9160,8 +9918,8 @@
         </p:blipFill>
         <p:spPr>
           <a:xfrm>
-            <a:off x="311704" y="1152475"/>
-            <a:ext cx="5979875" cy="3580475"/>
+            <a:off x="405700" y="1034400"/>
+            <a:ext cx="2555584" cy="1104138"/>
           </a:xfrm>
           <a:prstGeom prst="rect">
             <a:avLst/>
@@ -9172,6 +9930,783 @@
           </a:ln>
         </p:spPr>
       </p:pic>
+      <p:pic>
+        <p:nvPicPr>
+          <p:cNvPr id="195" name="Google Shape;195;p32"/>
+          <p:cNvPicPr preferRelativeResize="0"/>
+          <p:nvPr/>
+        </p:nvPicPr>
+        <p:blipFill>
+          <a:blip r:embed="rId4">
+            <a:alphaModFix/>
+          </a:blip>
+          <a:stretch>
+            <a:fillRect/>
+          </a:stretch>
+        </p:blipFill>
+        <p:spPr>
+          <a:xfrm>
+            <a:off x="3319250" y="1152475"/>
+            <a:ext cx="4926474" cy="754775"/>
+          </a:xfrm>
+          <a:prstGeom prst="rect">
+            <a:avLst/>
+          </a:prstGeom>
+          <a:noFill/>
+          <a:ln>
+            <a:noFill/>
+          </a:ln>
+        </p:spPr>
+      </p:pic>
+      <p:pic>
+        <p:nvPicPr>
+          <p:cNvPr id="196" name="Google Shape;196;p32"/>
+          <p:cNvPicPr preferRelativeResize="0"/>
+          <p:nvPr/>
+        </p:nvPicPr>
+        <p:blipFill>
+          <a:blip r:embed="rId5">
+            <a:alphaModFix/>
+          </a:blip>
+          <a:stretch>
+            <a:fillRect/>
+          </a:stretch>
+        </p:blipFill>
+        <p:spPr>
+          <a:xfrm>
+            <a:off x="1561825" y="2181350"/>
+            <a:ext cx="4689719" cy="2858200"/>
+          </a:xfrm>
+          <a:prstGeom prst="rect">
+            <a:avLst/>
+          </a:prstGeom>
+          <a:noFill/>
+          <a:ln>
+            <a:noFill/>
+          </a:ln>
+        </p:spPr>
+      </p:pic>
+    </p:spTree>
+  </p:cSld>
+  <p:clrMapOvr>
+    <a:masterClrMapping/>
+  </p:clrMapOvr>
+</p:sld>
+</file>
+
+<file path=ppt/slides/slide21.xml><?xml version="1.0" encoding="utf-8"?>
+<p:sld xmlns:a="http://schemas.openxmlformats.org/drawingml/2006/main" xmlns:r="http://schemas.openxmlformats.org/officeDocument/2006/relationships" xmlns:mc="http://schemas.openxmlformats.org/markup-compatibility/2006" xmlns:mv="urn:schemas-microsoft-com:mac:vml" xmlns:p="http://schemas.openxmlformats.org/presentationml/2006/main" xmlns:c="http://schemas.openxmlformats.org/drawingml/2006/chart" xmlns:dgm="http://schemas.openxmlformats.org/drawingml/2006/diagram" xmlns:o="urn:schemas-microsoft-com:office:office" xmlns:v="urn:schemas-microsoft-com:vml" xmlns:pvml="urn:schemas-microsoft-com:office:powerpoint" xmlns:com="http://schemas.openxmlformats.org/drawingml/2006/compatibility" xmlns:p14="http://schemas.microsoft.com/office/powerpoint/2010/main" xmlns:p15="http://schemas.microsoft.com/office/powerpoint/2012/main" xmlns:ahyp="http://schemas.microsoft.com/office/drawing/2018/hyperlinkcolor">
+  <p:cSld>
+    <p:spTree>
+      <p:nvGrpSpPr>
+        <p:cNvPr id="200" name="Shape 200"/>
+        <p:cNvGrpSpPr/>
+        <p:nvPr/>
+      </p:nvGrpSpPr>
+      <p:grpSpPr>
+        <a:xfrm>
+          <a:off x="0" y="0"/>
+          <a:ext cx="0" cy="0"/>
+          <a:chOff x="0" y="0"/>
+          <a:chExt cx="0" cy="0"/>
+        </a:xfrm>
+      </p:grpSpPr>
+      <p:sp>
+        <p:nvSpPr>
+          <p:cNvPr id="201" name="Google Shape;201;p33"/>
+          <p:cNvSpPr txBox="1"/>
+          <p:nvPr>
+            <p:ph type="title"/>
+          </p:nvPr>
+        </p:nvSpPr>
+        <p:spPr>
+          <a:xfrm>
+            <a:off x="311700" y="445025"/>
+            <a:ext cx="8520600" cy="572700"/>
+          </a:xfrm>
+          <a:prstGeom prst="rect">
+            <a:avLst/>
+          </a:prstGeom>
+        </p:spPr>
+        <p:txBody>
+          <a:bodyPr anchorCtr="0" anchor="t" bIns="91425" lIns="91425" spcFirstLastPara="1" rIns="91425" wrap="square" tIns="91425">
+            <a:normAutofit fontScale="90000"/>
+          </a:bodyPr>
+          <a:lstStyle/>
+          <a:p>
+            <a:pPr indent="0" lvl="0" marL="0" rtl="0" algn="l">
+              <a:spcBef>
+                <a:spcPts val="0"/>
+              </a:spcBef>
+              <a:spcAft>
+                <a:spcPts val="0"/>
+              </a:spcAft>
+              <a:buNone/>
+            </a:pPr>
+            <a:r>
+              <a:t/>
+            </a:r>
+            <a:endParaRPr/>
+          </a:p>
+        </p:txBody>
+      </p:sp>
+      <p:sp>
+        <p:nvSpPr>
+          <p:cNvPr id="202" name="Google Shape;202;p33"/>
+          <p:cNvSpPr txBox="1"/>
+          <p:nvPr>
+            <p:ph idx="1" type="body"/>
+          </p:nvPr>
+        </p:nvSpPr>
+        <p:spPr>
+          <a:xfrm>
+            <a:off x="311700" y="1152475"/>
+            <a:ext cx="8520600" cy="3416400"/>
+          </a:xfrm>
+          <a:prstGeom prst="rect">
+            <a:avLst/>
+          </a:prstGeom>
+        </p:spPr>
+        <p:txBody>
+          <a:bodyPr anchorCtr="0" anchor="t" bIns="91425" lIns="91425" spcFirstLastPara="1" rIns="91425" wrap="square" tIns="91425">
+            <a:normAutofit/>
+          </a:bodyPr>
+          <a:lstStyle/>
+          <a:p>
+            <a:pPr indent="0" lvl="0" marL="0" rtl="0" algn="l">
+              <a:spcBef>
+                <a:spcPts val="0"/>
+              </a:spcBef>
+              <a:spcAft>
+                <a:spcPts val="1200"/>
+              </a:spcAft>
+              <a:buNone/>
+            </a:pPr>
+            <a:r>
+              <a:t/>
+            </a:r>
+            <a:endParaRPr/>
+          </a:p>
+        </p:txBody>
+      </p:sp>
+      <p:pic>
+        <p:nvPicPr>
+          <p:cNvPr id="203" name="Google Shape;203;p33"/>
+          <p:cNvPicPr preferRelativeResize="0"/>
+          <p:nvPr/>
+        </p:nvPicPr>
+        <p:blipFill>
+          <a:blip r:embed="rId3">
+            <a:alphaModFix/>
+          </a:blip>
+          <a:stretch>
+            <a:fillRect/>
+          </a:stretch>
+        </p:blipFill>
+        <p:spPr>
+          <a:xfrm>
+            <a:off x="311700" y="937600"/>
+            <a:ext cx="8579983" cy="3038275"/>
+          </a:xfrm>
+          <a:prstGeom prst="rect">
+            <a:avLst/>
+          </a:prstGeom>
+          <a:noFill/>
+          <a:ln>
+            <a:noFill/>
+          </a:ln>
+        </p:spPr>
+      </p:pic>
+    </p:spTree>
+  </p:cSld>
+  <p:clrMapOvr>
+    <a:masterClrMapping/>
+  </p:clrMapOvr>
+</p:sld>
+</file>
+
+<file path=ppt/slides/slide22.xml><?xml version="1.0" encoding="utf-8"?>
+<p:sld xmlns:a="http://schemas.openxmlformats.org/drawingml/2006/main" xmlns:r="http://schemas.openxmlformats.org/officeDocument/2006/relationships" xmlns:mc="http://schemas.openxmlformats.org/markup-compatibility/2006" xmlns:mv="urn:schemas-microsoft-com:mac:vml" xmlns:p="http://schemas.openxmlformats.org/presentationml/2006/main" xmlns:c="http://schemas.openxmlformats.org/drawingml/2006/chart" xmlns:dgm="http://schemas.openxmlformats.org/drawingml/2006/diagram" xmlns:o="urn:schemas-microsoft-com:office:office" xmlns:v="urn:schemas-microsoft-com:vml" xmlns:pvml="urn:schemas-microsoft-com:office:powerpoint" xmlns:com="http://schemas.openxmlformats.org/drawingml/2006/compatibility" xmlns:p14="http://schemas.microsoft.com/office/powerpoint/2010/main" xmlns:p15="http://schemas.microsoft.com/office/powerpoint/2012/main" xmlns:ahyp="http://schemas.microsoft.com/office/drawing/2018/hyperlinkcolor">
+  <p:cSld>
+    <p:spTree>
+      <p:nvGrpSpPr>
+        <p:cNvPr id="207" name="Shape 207"/>
+        <p:cNvGrpSpPr/>
+        <p:nvPr/>
+      </p:nvGrpSpPr>
+      <p:grpSpPr>
+        <a:xfrm>
+          <a:off x="0" y="0"/>
+          <a:ext cx="0" cy="0"/>
+          <a:chOff x="0" y="0"/>
+          <a:chExt cx="0" cy="0"/>
+        </a:xfrm>
+      </p:grpSpPr>
+      <p:sp>
+        <p:nvSpPr>
+          <p:cNvPr id="208" name="Google Shape;208;p34"/>
+          <p:cNvSpPr txBox="1"/>
+          <p:nvPr>
+            <p:ph type="title"/>
+          </p:nvPr>
+        </p:nvSpPr>
+        <p:spPr>
+          <a:xfrm>
+            <a:off x="311700" y="445025"/>
+            <a:ext cx="8520600" cy="572700"/>
+          </a:xfrm>
+          <a:prstGeom prst="rect">
+            <a:avLst/>
+          </a:prstGeom>
+        </p:spPr>
+        <p:txBody>
+          <a:bodyPr anchorCtr="0" anchor="t" bIns="91425" lIns="91425" spcFirstLastPara="1" rIns="91425" wrap="square" tIns="91425">
+            <a:normAutofit fontScale="90000"/>
+          </a:bodyPr>
+          <a:lstStyle/>
+          <a:p>
+            <a:pPr indent="0" lvl="0" marL="0" rtl="0" algn="l">
+              <a:spcBef>
+                <a:spcPts val="0"/>
+              </a:spcBef>
+              <a:spcAft>
+                <a:spcPts val="0"/>
+              </a:spcAft>
+              <a:buNone/>
+            </a:pPr>
+            <a:r>
+              <a:t/>
+            </a:r>
+            <a:endParaRPr/>
+          </a:p>
+        </p:txBody>
+      </p:sp>
+      <p:sp>
+        <p:nvSpPr>
+          <p:cNvPr id="209" name="Google Shape;209;p34"/>
+          <p:cNvSpPr txBox="1"/>
+          <p:nvPr>
+            <p:ph idx="1" type="body"/>
+          </p:nvPr>
+        </p:nvSpPr>
+        <p:spPr>
+          <a:xfrm>
+            <a:off x="311700" y="1152475"/>
+            <a:ext cx="8520600" cy="3416400"/>
+          </a:xfrm>
+          <a:prstGeom prst="rect">
+            <a:avLst/>
+          </a:prstGeom>
+        </p:spPr>
+        <p:txBody>
+          <a:bodyPr anchorCtr="0" anchor="t" bIns="91425" lIns="91425" spcFirstLastPara="1" rIns="91425" wrap="square" tIns="91425">
+            <a:normAutofit/>
+          </a:bodyPr>
+          <a:lstStyle/>
+          <a:p>
+            <a:pPr indent="0" lvl="0" marL="0" rtl="0" algn="l">
+              <a:spcBef>
+                <a:spcPts val="0"/>
+              </a:spcBef>
+              <a:spcAft>
+                <a:spcPts val="1200"/>
+              </a:spcAft>
+              <a:buNone/>
+            </a:pPr>
+            <a:r>
+              <a:t/>
+            </a:r>
+            <a:endParaRPr/>
+          </a:p>
+        </p:txBody>
+      </p:sp>
+      <p:pic>
+        <p:nvPicPr>
+          <p:cNvPr id="210" name="Google Shape;210;p34"/>
+          <p:cNvPicPr preferRelativeResize="0"/>
+          <p:nvPr/>
+        </p:nvPicPr>
+        <p:blipFill>
+          <a:blip r:embed="rId3">
+            <a:alphaModFix/>
+          </a:blip>
+          <a:stretch>
+            <a:fillRect/>
+          </a:stretch>
+        </p:blipFill>
+        <p:spPr>
+          <a:xfrm>
+            <a:off x="297000" y="1152475"/>
+            <a:ext cx="8549997" cy="3340100"/>
+          </a:xfrm>
+          <a:prstGeom prst="rect">
+            <a:avLst/>
+          </a:prstGeom>
+          <a:noFill/>
+          <a:ln>
+            <a:noFill/>
+          </a:ln>
+        </p:spPr>
+      </p:pic>
+    </p:spTree>
+  </p:cSld>
+  <p:clrMapOvr>
+    <a:masterClrMapping/>
+  </p:clrMapOvr>
+</p:sld>
+</file>
+
+<file path=ppt/slides/slide23.xml><?xml version="1.0" encoding="utf-8"?>
+<p:sld xmlns:a="http://schemas.openxmlformats.org/drawingml/2006/main" xmlns:r="http://schemas.openxmlformats.org/officeDocument/2006/relationships" xmlns:mc="http://schemas.openxmlformats.org/markup-compatibility/2006" xmlns:mv="urn:schemas-microsoft-com:mac:vml" xmlns:p="http://schemas.openxmlformats.org/presentationml/2006/main" xmlns:c="http://schemas.openxmlformats.org/drawingml/2006/chart" xmlns:dgm="http://schemas.openxmlformats.org/drawingml/2006/diagram" xmlns:o="urn:schemas-microsoft-com:office:office" xmlns:v="urn:schemas-microsoft-com:vml" xmlns:pvml="urn:schemas-microsoft-com:office:powerpoint" xmlns:com="http://schemas.openxmlformats.org/drawingml/2006/compatibility" xmlns:p14="http://schemas.microsoft.com/office/powerpoint/2010/main" xmlns:p15="http://schemas.microsoft.com/office/powerpoint/2012/main" xmlns:ahyp="http://schemas.microsoft.com/office/drawing/2018/hyperlinkcolor">
+  <p:cSld>
+    <p:spTree>
+      <p:nvGrpSpPr>
+        <p:cNvPr id="214" name="Shape 214"/>
+        <p:cNvGrpSpPr/>
+        <p:nvPr/>
+      </p:nvGrpSpPr>
+      <p:grpSpPr>
+        <a:xfrm>
+          <a:off x="0" y="0"/>
+          <a:ext cx="0" cy="0"/>
+          <a:chOff x="0" y="0"/>
+          <a:chExt cx="0" cy="0"/>
+        </a:xfrm>
+      </p:grpSpPr>
+      <p:sp>
+        <p:nvSpPr>
+          <p:cNvPr id="215" name="Google Shape;215;p35"/>
+          <p:cNvSpPr txBox="1"/>
+          <p:nvPr>
+            <p:ph type="title"/>
+          </p:nvPr>
+        </p:nvSpPr>
+        <p:spPr>
+          <a:xfrm>
+            <a:off x="311700" y="445025"/>
+            <a:ext cx="8520600" cy="572700"/>
+          </a:xfrm>
+          <a:prstGeom prst="rect">
+            <a:avLst/>
+          </a:prstGeom>
+        </p:spPr>
+        <p:txBody>
+          <a:bodyPr anchorCtr="0" anchor="t" bIns="91425" lIns="91425" spcFirstLastPara="1" rIns="91425" wrap="square" tIns="91425">
+            <a:normAutofit fontScale="90000"/>
+          </a:bodyPr>
+          <a:lstStyle/>
+          <a:p>
+            <a:pPr indent="0" lvl="0" marL="0" rtl="0" algn="l">
+              <a:spcBef>
+                <a:spcPts val="0"/>
+              </a:spcBef>
+              <a:spcAft>
+                <a:spcPts val="0"/>
+              </a:spcAft>
+              <a:buNone/>
+            </a:pPr>
+            <a:r>
+              <a:t/>
+            </a:r>
+            <a:endParaRPr/>
+          </a:p>
+        </p:txBody>
+      </p:sp>
+      <p:sp>
+        <p:nvSpPr>
+          <p:cNvPr id="216" name="Google Shape;216;p35"/>
+          <p:cNvSpPr txBox="1"/>
+          <p:nvPr>
+            <p:ph idx="1" type="body"/>
+          </p:nvPr>
+        </p:nvSpPr>
+        <p:spPr>
+          <a:xfrm>
+            <a:off x="311700" y="1152475"/>
+            <a:ext cx="8520600" cy="3416400"/>
+          </a:xfrm>
+          <a:prstGeom prst="rect">
+            <a:avLst/>
+          </a:prstGeom>
+        </p:spPr>
+        <p:txBody>
+          <a:bodyPr anchorCtr="0" anchor="t" bIns="91425" lIns="91425" spcFirstLastPara="1" rIns="91425" wrap="square" tIns="91425">
+            <a:normAutofit/>
+          </a:bodyPr>
+          <a:lstStyle/>
+          <a:p>
+            <a:pPr indent="0" lvl="0" marL="0" rtl="0" algn="l">
+              <a:spcBef>
+                <a:spcPts val="0"/>
+              </a:spcBef>
+              <a:spcAft>
+                <a:spcPts val="1200"/>
+              </a:spcAft>
+              <a:buNone/>
+            </a:pPr>
+            <a:r>
+              <a:t/>
+            </a:r>
+            <a:endParaRPr/>
+          </a:p>
+        </p:txBody>
+      </p:sp>
+      <p:pic>
+        <p:nvPicPr>
+          <p:cNvPr id="217" name="Google Shape;217;p35"/>
+          <p:cNvPicPr preferRelativeResize="0"/>
+          <p:nvPr/>
+        </p:nvPicPr>
+        <p:blipFill>
+          <a:blip r:embed="rId3">
+            <a:alphaModFix/>
+          </a:blip>
+          <a:stretch>
+            <a:fillRect/>
+          </a:stretch>
+        </p:blipFill>
+        <p:spPr>
+          <a:xfrm>
+            <a:off x="311700" y="1005577"/>
+            <a:ext cx="7909975" cy="3132350"/>
+          </a:xfrm>
+          <a:prstGeom prst="rect">
+            <a:avLst/>
+          </a:prstGeom>
+          <a:noFill/>
+          <a:ln>
+            <a:noFill/>
+          </a:ln>
+        </p:spPr>
+      </p:pic>
+    </p:spTree>
+  </p:cSld>
+  <p:clrMapOvr>
+    <a:masterClrMapping/>
+  </p:clrMapOvr>
+</p:sld>
+</file>
+
+<file path=ppt/slides/slide24.xml><?xml version="1.0" encoding="utf-8"?>
+<p:sld xmlns:a="http://schemas.openxmlformats.org/drawingml/2006/main" xmlns:r="http://schemas.openxmlformats.org/officeDocument/2006/relationships" xmlns:mc="http://schemas.openxmlformats.org/markup-compatibility/2006" xmlns:mv="urn:schemas-microsoft-com:mac:vml" xmlns:p="http://schemas.openxmlformats.org/presentationml/2006/main" xmlns:c="http://schemas.openxmlformats.org/drawingml/2006/chart" xmlns:dgm="http://schemas.openxmlformats.org/drawingml/2006/diagram" xmlns:o="urn:schemas-microsoft-com:office:office" xmlns:v="urn:schemas-microsoft-com:vml" xmlns:pvml="urn:schemas-microsoft-com:office:powerpoint" xmlns:com="http://schemas.openxmlformats.org/drawingml/2006/compatibility" xmlns:p14="http://schemas.microsoft.com/office/powerpoint/2010/main" xmlns:p15="http://schemas.microsoft.com/office/powerpoint/2012/main" xmlns:ahyp="http://schemas.microsoft.com/office/drawing/2018/hyperlinkcolor">
+  <p:cSld>
+    <p:spTree>
+      <p:nvGrpSpPr>
+        <p:cNvPr id="221" name="Shape 221"/>
+        <p:cNvGrpSpPr/>
+        <p:nvPr/>
+      </p:nvGrpSpPr>
+      <p:grpSpPr>
+        <a:xfrm>
+          <a:off x="0" y="0"/>
+          <a:ext cx="0" cy="0"/>
+          <a:chOff x="0" y="0"/>
+          <a:chExt cx="0" cy="0"/>
+        </a:xfrm>
+      </p:grpSpPr>
+      <p:sp>
+        <p:nvSpPr>
+          <p:cNvPr id="222" name="Google Shape;222;p36"/>
+          <p:cNvSpPr txBox="1"/>
+          <p:nvPr>
+            <p:ph type="title"/>
+          </p:nvPr>
+        </p:nvSpPr>
+        <p:spPr>
+          <a:xfrm>
+            <a:off x="311700" y="445025"/>
+            <a:ext cx="8520600" cy="572700"/>
+          </a:xfrm>
+          <a:prstGeom prst="rect">
+            <a:avLst/>
+          </a:prstGeom>
+        </p:spPr>
+        <p:txBody>
+          <a:bodyPr anchorCtr="0" anchor="t" bIns="91425" lIns="91425" spcFirstLastPara="1" rIns="91425" wrap="square" tIns="91425">
+            <a:normAutofit fontScale="90000"/>
+          </a:bodyPr>
+          <a:lstStyle/>
+          <a:p>
+            <a:pPr indent="0" lvl="0" marL="0" rtl="0" algn="l">
+              <a:spcBef>
+                <a:spcPts val="0"/>
+              </a:spcBef>
+              <a:spcAft>
+                <a:spcPts val="0"/>
+              </a:spcAft>
+              <a:buNone/>
+            </a:pPr>
+            <a:r>
+              <a:t/>
+            </a:r>
+            <a:endParaRPr/>
+          </a:p>
+        </p:txBody>
+      </p:sp>
+      <p:sp>
+        <p:nvSpPr>
+          <p:cNvPr id="223" name="Google Shape;223;p36"/>
+          <p:cNvSpPr txBox="1"/>
+          <p:nvPr>
+            <p:ph idx="1" type="body"/>
+          </p:nvPr>
+        </p:nvSpPr>
+        <p:spPr>
+          <a:xfrm>
+            <a:off x="311700" y="1152475"/>
+            <a:ext cx="8520600" cy="3416400"/>
+          </a:xfrm>
+          <a:prstGeom prst="rect">
+            <a:avLst/>
+          </a:prstGeom>
+        </p:spPr>
+        <p:txBody>
+          <a:bodyPr anchorCtr="0" anchor="t" bIns="91425" lIns="91425" spcFirstLastPara="1" rIns="91425" wrap="square" tIns="91425">
+            <a:normAutofit/>
+          </a:bodyPr>
+          <a:lstStyle/>
+          <a:p>
+            <a:pPr indent="0" lvl="0" marL="0" rtl="0" algn="l">
+              <a:spcBef>
+                <a:spcPts val="0"/>
+              </a:spcBef>
+              <a:spcAft>
+                <a:spcPts val="1200"/>
+              </a:spcAft>
+              <a:buNone/>
+            </a:pPr>
+            <a:r>
+              <a:t/>
+            </a:r>
+            <a:endParaRPr/>
+          </a:p>
+        </p:txBody>
+      </p:sp>
+      <p:pic>
+        <p:nvPicPr>
+          <p:cNvPr id="224" name="Google Shape;224;p36"/>
+          <p:cNvPicPr preferRelativeResize="0"/>
+          <p:nvPr/>
+        </p:nvPicPr>
+        <p:blipFill>
+          <a:blip r:embed="rId3">
+            <a:alphaModFix/>
+          </a:blip>
+          <a:stretch>
+            <a:fillRect/>
+          </a:stretch>
+        </p:blipFill>
+        <p:spPr>
+          <a:xfrm>
+            <a:off x="311700" y="1152474"/>
+            <a:ext cx="8071126" cy="1673450"/>
+          </a:xfrm>
+          <a:prstGeom prst="rect">
+            <a:avLst/>
+          </a:prstGeom>
+          <a:noFill/>
+          <a:ln>
+            <a:noFill/>
+          </a:ln>
+        </p:spPr>
+      </p:pic>
+    </p:spTree>
+  </p:cSld>
+  <p:clrMapOvr>
+    <a:masterClrMapping/>
+  </p:clrMapOvr>
+</p:sld>
+</file>
+
+<file path=ppt/slides/slide25.xml><?xml version="1.0" encoding="utf-8"?>
+<p:sld xmlns:a="http://schemas.openxmlformats.org/drawingml/2006/main" xmlns:r="http://schemas.openxmlformats.org/officeDocument/2006/relationships" xmlns:mc="http://schemas.openxmlformats.org/markup-compatibility/2006" xmlns:mv="urn:schemas-microsoft-com:mac:vml" xmlns:p="http://schemas.openxmlformats.org/presentationml/2006/main" xmlns:c="http://schemas.openxmlformats.org/drawingml/2006/chart" xmlns:dgm="http://schemas.openxmlformats.org/drawingml/2006/diagram" xmlns:o="urn:schemas-microsoft-com:office:office" xmlns:v="urn:schemas-microsoft-com:vml" xmlns:pvml="urn:schemas-microsoft-com:office:powerpoint" xmlns:com="http://schemas.openxmlformats.org/drawingml/2006/compatibility" xmlns:p14="http://schemas.microsoft.com/office/powerpoint/2010/main" xmlns:p15="http://schemas.microsoft.com/office/powerpoint/2012/main" xmlns:ahyp="http://schemas.microsoft.com/office/drawing/2018/hyperlinkcolor">
+  <p:cSld>
+    <p:spTree>
+      <p:nvGrpSpPr>
+        <p:cNvPr id="228" name="Shape 228"/>
+        <p:cNvGrpSpPr/>
+        <p:nvPr/>
+      </p:nvGrpSpPr>
+      <p:grpSpPr>
+        <a:xfrm>
+          <a:off x="0" y="0"/>
+          <a:ext cx="0" cy="0"/>
+          <a:chOff x="0" y="0"/>
+          <a:chExt cx="0" cy="0"/>
+        </a:xfrm>
+      </p:grpSpPr>
+      <p:sp>
+        <p:nvSpPr>
+          <p:cNvPr id="229" name="Google Shape;229;p37"/>
+          <p:cNvSpPr txBox="1"/>
+          <p:nvPr>
+            <p:ph type="title"/>
+          </p:nvPr>
+        </p:nvSpPr>
+        <p:spPr>
+          <a:xfrm>
+            <a:off x="311700" y="445025"/>
+            <a:ext cx="8520600" cy="572700"/>
+          </a:xfrm>
+          <a:prstGeom prst="rect">
+            <a:avLst/>
+          </a:prstGeom>
+        </p:spPr>
+        <p:txBody>
+          <a:bodyPr anchorCtr="0" anchor="t" bIns="91425" lIns="91425" spcFirstLastPara="1" rIns="91425" wrap="square" tIns="91425">
+            <a:normAutofit fontScale="90000"/>
+          </a:bodyPr>
+          <a:lstStyle/>
+          <a:p>
+            <a:pPr indent="0" lvl="0" marL="0" rtl="0" algn="l">
+              <a:spcBef>
+                <a:spcPts val="0"/>
+              </a:spcBef>
+              <a:spcAft>
+                <a:spcPts val="0"/>
+              </a:spcAft>
+              <a:buNone/>
+            </a:pPr>
+            <a:r>
+              <a:rPr lang="id"/>
+              <a:t>Price Comparison between room types</a:t>
+            </a:r>
+            <a:endParaRPr/>
+          </a:p>
+        </p:txBody>
+      </p:sp>
+      <p:sp>
+        <p:nvSpPr>
+          <p:cNvPr id="230" name="Google Shape;230;p37"/>
+          <p:cNvSpPr txBox="1"/>
+          <p:nvPr>
+            <p:ph idx="1" type="body"/>
+          </p:nvPr>
+        </p:nvSpPr>
+        <p:spPr>
+          <a:xfrm>
+            <a:off x="311700" y="1152475"/>
+            <a:ext cx="8520600" cy="3416400"/>
+          </a:xfrm>
+          <a:prstGeom prst="rect">
+            <a:avLst/>
+          </a:prstGeom>
+        </p:spPr>
+        <p:txBody>
+          <a:bodyPr anchorCtr="0" anchor="t" bIns="91425" lIns="91425" spcFirstLastPara="1" rIns="91425" wrap="square" tIns="91425">
+            <a:normAutofit/>
+          </a:bodyPr>
+          <a:lstStyle/>
+          <a:p>
+            <a:pPr indent="0" lvl="0" marL="0" rtl="0" algn="l">
+              <a:spcBef>
+                <a:spcPts val="0"/>
+              </a:spcBef>
+              <a:spcAft>
+                <a:spcPts val="1200"/>
+              </a:spcAft>
+              <a:buNone/>
+            </a:pPr>
+            <a:r>
+              <a:t/>
+            </a:r>
+            <a:endParaRPr/>
+          </a:p>
+        </p:txBody>
+      </p:sp>
+      <p:pic>
+        <p:nvPicPr>
+          <p:cNvPr id="231" name="Google Shape;231;p37"/>
+          <p:cNvPicPr preferRelativeResize="0"/>
+          <p:nvPr/>
+        </p:nvPicPr>
+        <p:blipFill>
+          <a:blip r:embed="rId3">
+            <a:alphaModFix/>
+          </a:blip>
+          <a:stretch>
+            <a:fillRect/>
+          </a:stretch>
+        </p:blipFill>
+        <p:spPr>
+          <a:xfrm>
+            <a:off x="311704" y="1152475"/>
+            <a:ext cx="5979875" cy="3580475"/>
+          </a:xfrm>
+          <a:prstGeom prst="rect">
+            <a:avLst/>
+          </a:prstGeom>
+          <a:noFill/>
+          <a:ln>
+            <a:noFill/>
+          </a:ln>
+        </p:spPr>
+      </p:pic>
+    </p:spTree>
+  </p:cSld>
+  <p:clrMapOvr>
+    <a:masterClrMapping/>
+  </p:clrMapOvr>
+</p:sld>
+</file>
+
+<file path=ppt/slides/slide26.xml><?xml version="1.0" encoding="utf-8"?>
+<p:sld xmlns:a="http://schemas.openxmlformats.org/drawingml/2006/main" xmlns:r="http://schemas.openxmlformats.org/officeDocument/2006/relationships" xmlns:mc="http://schemas.openxmlformats.org/markup-compatibility/2006" xmlns:mv="urn:schemas-microsoft-com:mac:vml" xmlns:p="http://schemas.openxmlformats.org/presentationml/2006/main" xmlns:c="http://schemas.openxmlformats.org/drawingml/2006/chart" xmlns:dgm="http://schemas.openxmlformats.org/drawingml/2006/diagram" xmlns:o="urn:schemas-microsoft-com:office:office" xmlns:v="urn:schemas-microsoft-com:vml" xmlns:pvml="urn:schemas-microsoft-com:office:powerpoint" xmlns:com="http://schemas.openxmlformats.org/drawingml/2006/compatibility" xmlns:p14="http://schemas.microsoft.com/office/powerpoint/2010/main" xmlns:p15="http://schemas.microsoft.com/office/powerpoint/2012/main" xmlns:ahyp="http://schemas.microsoft.com/office/drawing/2018/hyperlinkcolor">
+  <p:cSld>
+    <p:spTree>
+      <p:nvGrpSpPr>
+        <p:cNvPr id="235" name="Shape 235"/>
+        <p:cNvGrpSpPr/>
+        <p:nvPr/>
+      </p:nvGrpSpPr>
+      <p:grpSpPr>
+        <a:xfrm>
+          <a:off x="0" y="0"/>
+          <a:ext cx="0" cy="0"/>
+          <a:chOff x="0" y="0"/>
+          <a:chExt cx="0" cy="0"/>
+        </a:xfrm>
+      </p:grpSpPr>
+      <p:sp>
+        <p:nvSpPr>
+          <p:cNvPr id="236" name="Google Shape;236;p38"/>
+          <p:cNvSpPr txBox="1"/>
+          <p:nvPr>
+            <p:ph type="title"/>
+          </p:nvPr>
+        </p:nvSpPr>
+        <p:spPr>
+          <a:xfrm>
+            <a:off x="490250" y="450150"/>
+            <a:ext cx="6367800" cy="4090800"/>
+          </a:xfrm>
+          <a:prstGeom prst="rect">
+            <a:avLst/>
+          </a:prstGeom>
+        </p:spPr>
+        <p:txBody>
+          <a:bodyPr anchorCtr="0" anchor="ctr" bIns="91425" lIns="91425" spcFirstLastPara="1" rIns="91425" wrap="square" tIns="91425">
+            <a:normAutofit/>
+          </a:bodyPr>
+          <a:lstStyle/>
+          <a:p>
+            <a:pPr indent="0" lvl="0" marL="0" rtl="0" algn="l">
+              <a:spcBef>
+                <a:spcPts val="0"/>
+              </a:spcBef>
+              <a:spcAft>
+                <a:spcPts val="0"/>
+              </a:spcAft>
+              <a:buNone/>
+            </a:pPr>
+            <a:r>
+              <a:rPr lang="id"/>
+              <a:t>Terima Kasih!</a:t>
+            </a:r>
+            <a:endParaRPr/>
+          </a:p>
+        </p:txBody>
+      </p:sp>
     </p:spTree>
   </p:cSld>
   <p:clrMapOvr>
@@ -9362,8 +10897,7 @@
               <a:buNone/>
             </a:pPr>
             <a:r>
-              <a:rPr lang="id"/>
-              <a:t>Step 3.1: Inspect Data Types</a:t>
+              <a:t/>
             </a:r>
             <a:endParaRPr/>
           </a:p>
@@ -9424,8 +10958,8 @@
         </p:blipFill>
         <p:spPr>
           <a:xfrm>
-            <a:off x="507050" y="1017713"/>
-            <a:ext cx="3886200" cy="3819525"/>
+            <a:off x="0" y="1382400"/>
+            <a:ext cx="8993850" cy="2956550"/>
           </a:xfrm>
           <a:prstGeom prst="rect">
             <a:avLst/>
@@ -9436,6 +10970,69 @@
           </a:ln>
         </p:spPr>
       </p:pic>
+      <p:sp>
+        <p:nvSpPr>
+          <p:cNvPr id="77" name="Google Shape;77;p16"/>
+          <p:cNvSpPr/>
+          <p:nvPr/>
+        </p:nvSpPr>
+        <p:spPr>
+          <a:xfrm>
+            <a:off x="4956652" y="2526602"/>
+            <a:ext cx="1799600" cy="629150"/>
+          </a:xfrm>
+          <a:custGeom>
+            <a:rect b="b" l="l" r="r" t="t"/>
+            <a:pathLst>
+              <a:path extrusionOk="0" h="25166" w="71984">
+                <a:moveTo>
+                  <a:pt x="20904" y="3686"/>
+                </a:moveTo>
+                <a:cubicBezTo>
+                  <a:pt x="14924" y="698"/>
+                  <a:pt x="5038" y="1023"/>
+                  <a:pt x="1028" y="6372"/>
+                </a:cubicBezTo>
+                <a:cubicBezTo>
+                  <a:pt x="-2730" y="11384"/>
+                  <a:pt x="5094" y="19685"/>
+                  <a:pt x="10697" y="22487"/>
+                </a:cubicBezTo>
+                <a:cubicBezTo>
+                  <a:pt x="22086" y="28182"/>
+                  <a:pt x="36351" y="22836"/>
+                  <a:pt x="48837" y="20339"/>
+                </a:cubicBezTo>
+                <a:cubicBezTo>
+                  <a:pt x="56038" y="18899"/>
+                  <a:pt x="67084" y="26100"/>
+                  <a:pt x="70861" y="19802"/>
+                </a:cubicBezTo>
+                <a:cubicBezTo>
+                  <a:pt x="74042" y="14498"/>
+                  <a:pt x="69746" y="4567"/>
+                  <a:pt x="63878" y="2612"/>
+                </a:cubicBezTo>
+                <a:cubicBezTo>
+                  <a:pt x="50108" y="-1976"/>
+                  <a:pt x="34880" y="1000"/>
+                  <a:pt x="20366" y="1000"/>
+                </a:cubicBezTo>
+              </a:path>
+            </a:pathLst>
+          </a:custGeom>
+          <a:noFill/>
+          <a:ln cap="flat" cmpd="sng" w="28575">
+            <a:solidFill>
+              <a:srgbClr val="FF0000"/>
+            </a:solidFill>
+            <a:prstDash val="solid"/>
+            <a:round/>
+            <a:headEnd len="med" w="med" type="none"/>
+            <a:tailEnd len="med" w="med" type="none"/>
+          </a:ln>
+        </p:spPr>
+      </p:sp>
     </p:spTree>
   </p:cSld>
   <p:clrMapOvr>
@@ -9449,7 +11046,7 @@
   <p:cSld>
     <p:spTree>
       <p:nvGrpSpPr>
-        <p:cNvPr id="80" name="Shape 80"/>
+        <p:cNvPr id="81" name="Shape 81"/>
         <p:cNvGrpSpPr/>
         <p:nvPr/>
       </p:nvGrpSpPr>
@@ -9463,7 +11060,7 @@
       </p:grpSpPr>
       <p:sp>
         <p:nvSpPr>
-          <p:cNvPr id="81" name="Google Shape;81;p17"/>
+          <p:cNvPr id="82" name="Google Shape;82;p17"/>
           <p:cNvSpPr txBox="1"/>
           <p:nvPr>
             <p:ph type="title"/>
@@ -9495,7 +11092,7 @@
             </a:pPr>
             <a:r>
               <a:rPr lang="id"/>
-              <a:t>Step 3.2: Change Inappropriate Data Type</a:t>
+              <a:t>Step 3.1: Inspect Data Types</a:t>
             </a:r>
             <a:endParaRPr/>
           </a:p>
@@ -9503,7 +11100,7 @@
       </p:sp>
       <p:sp>
         <p:nvSpPr>
-          <p:cNvPr id="82" name="Google Shape;82;p17"/>
+          <p:cNvPr id="83" name="Google Shape;83;p17"/>
           <p:cNvSpPr txBox="1"/>
           <p:nvPr>
             <p:ph idx="1" type="body"/>
@@ -9511,8 +11108,8 @@
         </p:nvSpPr>
         <p:spPr>
           <a:xfrm>
-            <a:off x="311700" y="1152475"/>
-            <a:ext cx="8520600" cy="3416400"/>
+            <a:off x="4740625" y="1152475"/>
+            <a:ext cx="4091700" cy="3416400"/>
           </a:xfrm>
           <a:prstGeom prst="rect">
             <a:avLst/>
@@ -9534,7 +11131,8 @@
               <a:buNone/>
             </a:pPr>
             <a:r>
-              <a:t/>
+              <a:rPr lang="id"/>
+              <a:t>Dapat dilihat bahwa ‘last_review’ memiliki tipe ‘object’ dan bukan ‘datetime’</a:t>
             </a:r>
             <a:endParaRPr/>
           </a:p>
@@ -9542,7 +11140,7 @@
       </p:sp>
       <p:pic>
         <p:nvPicPr>
-          <p:cNvPr id="83" name="Google Shape;83;p17"/>
+          <p:cNvPr id="84" name="Google Shape;84;p17"/>
           <p:cNvPicPr preferRelativeResize="0"/>
           <p:nvPr/>
         </p:nvPicPr>
@@ -9556,8 +11154,8 @@
         </p:blipFill>
         <p:spPr>
           <a:xfrm>
-            <a:off x="365875" y="1017713"/>
-            <a:ext cx="4114800" cy="3876675"/>
+            <a:off x="507050" y="1017713"/>
+            <a:ext cx="3886200" cy="3819525"/>
           </a:xfrm>
           <a:prstGeom prst="rect">
             <a:avLst/>
@@ -9581,7 +11179,7 @@
   <p:cSld>
     <p:spTree>
       <p:nvGrpSpPr>
-        <p:cNvPr id="87" name="Shape 87"/>
+        <p:cNvPr id="88" name="Shape 88"/>
         <p:cNvGrpSpPr/>
         <p:nvPr/>
       </p:nvGrpSpPr>
@@ -9595,7 +11193,7 @@
       </p:grpSpPr>
       <p:sp>
         <p:nvSpPr>
-          <p:cNvPr id="88" name="Google Shape;88;p18"/>
+          <p:cNvPr id="89" name="Google Shape;89;p18"/>
           <p:cNvSpPr txBox="1"/>
           <p:nvPr>
             <p:ph type="title"/>
@@ -9627,7 +11225,7 @@
             </a:pPr>
             <a:r>
               <a:rPr lang="id"/>
-              <a:t>Step 3.3: Check Missing Values</a:t>
+              <a:t>Step 3.2: Change Inappropriate Data Type</a:t>
             </a:r>
             <a:endParaRPr/>
           </a:p>
@@ -9635,7 +11233,7 @@
       </p:sp>
       <p:sp>
         <p:nvSpPr>
-          <p:cNvPr id="89" name="Google Shape;89;p18"/>
+          <p:cNvPr id="90" name="Google Shape;90;p18"/>
           <p:cNvSpPr txBox="1"/>
           <p:nvPr>
             <p:ph idx="1" type="body"/>
@@ -9674,7 +11272,7 @@
       </p:sp>
       <p:pic>
         <p:nvPicPr>
-          <p:cNvPr id="90" name="Google Shape;90;p18"/>
+          <p:cNvPr id="91" name="Google Shape;91;p18"/>
           <p:cNvPicPr preferRelativeResize="0"/>
           <p:nvPr/>
         </p:nvPicPr>
@@ -9688,8 +11286,8 @@
         </p:blipFill>
         <p:spPr>
           <a:xfrm>
-            <a:off x="373613" y="1017725"/>
-            <a:ext cx="3857625" cy="3810000"/>
+            <a:off x="365875" y="1017713"/>
+            <a:ext cx="4114800" cy="3876675"/>
           </a:xfrm>
           <a:prstGeom prst="rect">
             <a:avLst/>
@@ -9713,7 +11311,7 @@
   <p:cSld>
     <p:spTree>
       <p:nvGrpSpPr>
-        <p:cNvPr id="94" name="Shape 94"/>
+        <p:cNvPr id="95" name="Shape 95"/>
         <p:cNvGrpSpPr/>
         <p:nvPr/>
       </p:nvGrpSpPr>
@@ -9727,7 +11325,7 @@
       </p:grpSpPr>
       <p:sp>
         <p:nvSpPr>
-          <p:cNvPr id="95" name="Google Shape;95;p19"/>
+          <p:cNvPr id="96" name="Google Shape;96;p19"/>
           <p:cNvSpPr txBox="1"/>
           <p:nvPr>
             <p:ph type="title"/>
@@ -9759,7 +11357,7 @@
             </a:pPr>
             <a:r>
               <a:rPr lang="id"/>
-              <a:t>Step 4: Show Statistical Properties</a:t>
+              <a:t>Step 3.3: Check Missing Values</a:t>
             </a:r>
             <a:endParaRPr/>
           </a:p>
@@ -9767,7 +11365,7 @@
       </p:sp>
       <p:sp>
         <p:nvSpPr>
-          <p:cNvPr id="96" name="Google Shape;96;p19"/>
+          <p:cNvPr id="97" name="Google Shape;97;p19"/>
           <p:cNvSpPr txBox="1"/>
           <p:nvPr>
             <p:ph idx="1" type="body"/>
@@ -9775,8 +11373,8 @@
         </p:nvSpPr>
         <p:spPr>
           <a:xfrm>
-            <a:off x="311700" y="1152475"/>
-            <a:ext cx="8520600" cy="3416400"/>
+            <a:off x="4767475" y="1152475"/>
+            <a:ext cx="4064700" cy="3416400"/>
           </a:xfrm>
           <a:prstGeom prst="rect">
             <a:avLst/>
@@ -9798,7 +11396,8 @@
               <a:buNone/>
             </a:pPr>
             <a:r>
-              <a:t/>
+              <a:rPr lang="id"/>
+              <a:t>Missing values terdapat pada kolom ‘name’, ‘host_name’, ‘last_review’, dan ‘review_per_month’</a:t>
             </a:r>
             <a:endParaRPr/>
           </a:p>
@@ -9806,7 +11405,7 @@
       </p:sp>
       <p:pic>
         <p:nvPicPr>
-          <p:cNvPr id="97" name="Google Shape;97;p19"/>
+          <p:cNvPr id="98" name="Google Shape;98;p19"/>
           <p:cNvPicPr preferRelativeResize="0"/>
           <p:nvPr/>
         </p:nvPicPr>
@@ -9820,8 +11419,8 @@
         </p:blipFill>
         <p:spPr>
           <a:xfrm>
-            <a:off x="311688" y="1066800"/>
-            <a:ext cx="8181975" cy="3009900"/>
+            <a:off x="373613" y="1017725"/>
+            <a:ext cx="3857625" cy="3810000"/>
           </a:xfrm>
           <a:prstGeom prst="rect">
             <a:avLst/>
@@ -9845,7 +11444,7 @@
   <p:cSld>
     <p:spTree>
       <p:nvGrpSpPr>
-        <p:cNvPr id="101" name="Shape 101"/>
+        <p:cNvPr id="102" name="Shape 102"/>
         <p:cNvGrpSpPr/>
         <p:nvPr/>
       </p:nvGrpSpPr>
@@ -9859,7 +11458,7 @@
       </p:grpSpPr>
       <p:sp>
         <p:nvSpPr>
-          <p:cNvPr id="102" name="Google Shape;102;p20"/>
+          <p:cNvPr id="103" name="Google Shape;103;p20"/>
           <p:cNvSpPr txBox="1"/>
           <p:nvPr>
             <p:ph type="title"/>
@@ -9890,7 +11489,8 @@
               <a:buNone/>
             </a:pPr>
             <a:r>
-              <a:t/>
+              <a:rPr lang="id"/>
+              <a:t>Step 4: Show Statistical Properties</a:t>
             </a:r>
             <a:endParaRPr/>
           </a:p>
@@ -9898,7 +11498,7 @@
       </p:sp>
       <p:sp>
         <p:nvSpPr>
-          <p:cNvPr id="103" name="Google Shape;103;p20"/>
+          <p:cNvPr id="104" name="Google Shape;104;p20"/>
           <p:cNvSpPr txBox="1"/>
           <p:nvPr>
             <p:ph idx="1" type="body"/>
@@ -9906,8 +11506,8 @@
         </p:nvSpPr>
         <p:spPr>
           <a:xfrm>
-            <a:off x="311700" y="1152475"/>
-            <a:ext cx="8520600" cy="3416400"/>
+            <a:off x="311700" y="4125775"/>
+            <a:ext cx="8520600" cy="735600"/>
           </a:xfrm>
           <a:prstGeom prst="rect">
             <a:avLst/>
@@ -9915,7 +11515,7 @@
         </p:spPr>
         <p:txBody>
           <a:bodyPr anchorCtr="0" anchor="t" bIns="91425" lIns="91425" spcFirstLastPara="1" rIns="91425" wrap="square" tIns="91425">
-            <a:normAutofit/>
+            <a:normAutofit lnSpcReduction="20000"/>
           </a:bodyPr>
           <a:lstStyle/>
           <a:p>
@@ -9929,7 +11529,8 @@
               <a:buNone/>
             </a:pPr>
             <a:r>
-              <a:t/>
+              <a:rPr lang="id"/>
+              <a:t>Tidak semua data penting, seperti misalnya id dan host_id, sehingga tidak perlu ditampilkan</a:t>
             </a:r>
             <a:endParaRPr/>
           </a:p>
@@ -9937,7 +11538,7 @@
       </p:sp>
       <p:pic>
         <p:nvPicPr>
-          <p:cNvPr id="104" name="Google Shape;104;p20"/>
+          <p:cNvPr id="105" name="Google Shape;105;p20"/>
           <p:cNvPicPr preferRelativeResize="0"/>
           <p:nvPr/>
         </p:nvPicPr>
@@ -9951,8 +11552,8 @@
         </p:blipFill>
         <p:spPr>
           <a:xfrm>
-            <a:off x="311688" y="1109650"/>
-            <a:ext cx="7553325" cy="2924175"/>
+            <a:off x="311688" y="1066800"/>
+            <a:ext cx="8181975" cy="3009900"/>
           </a:xfrm>
           <a:prstGeom prst="rect">
             <a:avLst/>
@@ -9976,7 +11577,7 @@
   <p:cSld>
     <p:spTree>
       <p:nvGrpSpPr>
-        <p:cNvPr id="108" name="Shape 108"/>
+        <p:cNvPr id="109" name="Shape 109"/>
         <p:cNvGrpSpPr/>
         <p:nvPr/>
       </p:nvGrpSpPr>
@@ -9990,7 +11591,7 @@
       </p:grpSpPr>
       <p:sp>
         <p:nvSpPr>
-          <p:cNvPr id="109" name="Google Shape;109;p21"/>
+          <p:cNvPr id="110" name="Google Shape;110;p21"/>
           <p:cNvSpPr txBox="1"/>
           <p:nvPr>
             <p:ph type="title"/>
@@ -10029,7 +11630,7 @@
       </p:sp>
       <p:sp>
         <p:nvSpPr>
-          <p:cNvPr id="110" name="Google Shape;110;p21"/>
+          <p:cNvPr id="111" name="Google Shape;111;p21"/>
           <p:cNvSpPr txBox="1"/>
           <p:nvPr>
             <p:ph idx="1" type="body"/>
@@ -10068,7 +11669,7 @@
       </p:sp>
       <p:pic>
         <p:nvPicPr>
-          <p:cNvPr id="111" name="Google Shape;111;p21"/>
+          <p:cNvPr id="112" name="Google Shape;112;p21"/>
           <p:cNvPicPr preferRelativeResize="0"/>
           <p:nvPr/>
         </p:nvPicPr>
@@ -10082,8 +11683,8 @@
         </p:blipFill>
         <p:spPr>
           <a:xfrm>
-            <a:off x="311688" y="1152463"/>
-            <a:ext cx="2695575" cy="2733675"/>
+            <a:off x="311688" y="1109650"/>
+            <a:ext cx="7553325" cy="2924175"/>
           </a:xfrm>
           <a:prstGeom prst="rect">
             <a:avLst/>

</xml_diff>